<commit_message>
Added schema diagram and modified PPT (working)
</commit_message>
<xml_diff>
--- a/Project 2-ETL - ERP vs.AWE.pptx
+++ b/Project 2-ETL - ERP vs.AWE.pptx
@@ -6,6 +6,10 @@
   </p:sldMasterIdLst>
   <p:sldIdLst>
     <p:sldId id="284" r:id="rId5"/>
+    <p:sldId id="286" r:id="rId6"/>
+    <p:sldId id="287" r:id="rId7"/>
+    <p:sldId id="288" r:id="rId8"/>
+    <p:sldId id="285" r:id="rId9"/>
   </p:sldIdLst>
   <p:sldSz cx="12192000" cy="6858000"/>
   <p:notesSz cx="6858000" cy="9144000"/>
@@ -3689,7 +3693,7 @@
           <a:p>
             <a:fld id="{B78FDAD0-21E9-42D0-8C63-C6563197FC13}" type="datetimeFigureOut">
               <a:rPr lang="en-US" smtClean="0"/>
-              <a:t>12/13/2022</a:t>
+              <a:t>12/14/2022</a:t>
             </a:fld>
             <a:endParaRPr lang="en-US"/>
           </a:p>
@@ -4112,7 +4116,7 @@
         </p:nvSpPr>
         <p:spPr>
           <a:xfrm>
-            <a:off x="3489813" y="2619896"/>
+            <a:off x="4119546" y="2619896"/>
             <a:ext cx="1160580" cy="1160580"/>
           </a:xfrm>
           <a:prstGeom prst="ellipse">
@@ -4173,7 +4177,7 @@
         </p:nvSpPr>
         <p:spPr>
           <a:xfrm>
-            <a:off x="5982684" y="2619896"/>
+            <a:off x="6612417" y="2619896"/>
             <a:ext cx="1160580" cy="1160580"/>
           </a:xfrm>
           <a:prstGeom prst="ellipse">
@@ -4234,7 +4238,7 @@
         </p:nvSpPr>
         <p:spPr>
           <a:xfrm>
-            <a:off x="8348313" y="2564473"/>
+            <a:off x="8978046" y="2564473"/>
             <a:ext cx="1160580" cy="1160580"/>
           </a:xfrm>
           <a:prstGeom prst="ellipse">
@@ -4295,7 +4299,7 @@
         </p:nvSpPr>
         <p:spPr>
           <a:xfrm>
-            <a:off x="615199" y="1995091"/>
+            <a:off x="1244932" y="1995091"/>
             <a:ext cx="2153721" cy="2188976"/>
           </a:xfrm>
           <a:prstGeom prst="ellipse">
@@ -4398,7 +4402,7 @@
         </p:nvSpPr>
         <p:spPr>
           <a:xfrm flipH="1" flipV="1">
-            <a:off x="435428" y="1995091"/>
+            <a:off x="1065161" y="1995091"/>
             <a:ext cx="9747751" cy="2410190"/>
           </a:xfrm>
           <a:custGeom>
@@ -4842,7 +4846,7 @@
         </p:nvSpPr>
         <p:spPr>
           <a:xfrm>
-            <a:off x="343219" y="3010031"/>
+            <a:off x="972952" y="3010031"/>
             <a:ext cx="218092" cy="218092"/>
           </a:xfrm>
           <a:prstGeom prst="ellipse">
@@ -4896,7 +4900,7 @@
         </p:nvSpPr>
         <p:spPr>
           <a:xfrm>
-            <a:off x="10018975" y="3124471"/>
+            <a:off x="10648708" y="3124471"/>
             <a:ext cx="218092" cy="218092"/>
           </a:xfrm>
           <a:prstGeom prst="ellipse">
@@ -4958,7 +4962,7 @@
         </p:nvSpPr>
         <p:spPr>
           <a:xfrm>
-            <a:off x="793861" y="4524723"/>
+            <a:off x="1423594" y="4524723"/>
             <a:ext cx="1796396" cy="302186"/>
           </a:xfrm>
         </p:spPr>
@@ -4991,7 +4995,7 @@
         </p:nvSpPr>
         <p:spPr>
           <a:xfrm>
-            <a:off x="518673" y="4826909"/>
+            <a:off x="1148406" y="4826909"/>
             <a:ext cx="2590287" cy="706438"/>
           </a:xfrm>
         </p:spPr>
@@ -5071,7 +5075,7 @@
         </p:nvSpPr>
         <p:spPr>
           <a:xfrm>
-            <a:off x="3578966" y="4489432"/>
+            <a:off x="4208699" y="4489432"/>
             <a:ext cx="1796396" cy="302186"/>
           </a:xfrm>
         </p:spPr>
@@ -5104,7 +5108,7 @@
         </p:nvSpPr>
         <p:spPr>
           <a:xfrm>
-            <a:off x="3372572" y="4817169"/>
+            <a:off x="4002305" y="4817169"/>
             <a:ext cx="2139356" cy="706438"/>
           </a:xfrm>
         </p:spPr>
@@ -5179,7 +5183,7 @@
         </p:nvSpPr>
         <p:spPr>
           <a:xfrm>
-            <a:off x="6063252" y="4552152"/>
+            <a:off x="6692985" y="4552152"/>
             <a:ext cx="1796396" cy="302186"/>
           </a:xfrm>
         </p:spPr>
@@ -5212,7 +5216,7 @@
         </p:nvSpPr>
         <p:spPr>
           <a:xfrm>
-            <a:off x="5966400" y="4900573"/>
+            <a:off x="6596133" y="4900573"/>
             <a:ext cx="1813567" cy="706438"/>
           </a:xfrm>
         </p:spPr>
@@ -5302,7 +5306,7 @@
         </p:nvSpPr>
         <p:spPr>
           <a:xfrm>
-            <a:off x="8447337" y="4552855"/>
+            <a:off x="9077070" y="4552855"/>
             <a:ext cx="1796396" cy="302186"/>
           </a:xfrm>
         </p:spPr>
@@ -5335,7 +5339,7 @@
         </p:nvSpPr>
         <p:spPr>
           <a:xfrm>
-            <a:off x="8285976" y="4937316"/>
+            <a:off x="8915709" y="4937316"/>
             <a:ext cx="1813567" cy="706438"/>
           </a:xfrm>
         </p:spPr>
@@ -5421,23 +5425,7 @@
             </a:br>
             <a:r>
               <a:rPr lang="en-US" sz="1200" dirty="0"/>
-              <a:t>Our team will select, </a:t>
-            </a:r>
-            <a:r>
-              <a:rPr lang="en-US" sz="1200" dirty="0" err="1"/>
-              <a:t>analyse</a:t>
-            </a:r>
-            <a:r>
-              <a:rPr lang="en-US" sz="1200" dirty="0"/>
-              <a:t>, extract, transform and load a dataset to allow data analysts to </a:t>
-            </a:r>
-            <a:r>
-              <a:rPr lang="en-US" sz="1200" dirty="0" err="1"/>
-              <a:t>analyse</a:t>
-            </a:r>
-            <a:r>
-              <a:rPr lang="en-US" sz="1200" dirty="0"/>
-              <a:t> the following:</a:t>
+              <a:t>Our team will select, analyze, extract, transform and load a dataset to allow data analysts to analyze the following:</a:t>
             </a:r>
             <a:br>
               <a:rPr lang="en-US" sz="1200" dirty="0"/>
@@ -5452,12 +5440,319 @@
           </a:p>
         </p:txBody>
       </p:sp>
-      <p:sp>
-        <p:nvSpPr>
-          <p:cNvPr id="26" name="Text Placeholder 23">
-            <a:extLst>
-              <a:ext uri="{FF2B5EF4-FFF2-40B4-BE49-F238E27FC236}">
-                <a16:creationId xmlns:a16="http://schemas.microsoft.com/office/drawing/2014/main" id="{16CE35DF-AAD3-4C6F-AF34-D53852369A5E}"/>
+    </p:spTree>
+    <p:extLst>
+      <p:ext uri="{BB962C8B-B14F-4D97-AF65-F5344CB8AC3E}">
+        <p14:creationId xmlns:p14="http://schemas.microsoft.com/office/powerpoint/2010/main" val="4230622197"/>
+      </p:ext>
+    </p:extLst>
+  </p:cSld>
+  <p:clrMapOvr>
+    <a:masterClrMapping/>
+  </p:clrMapOvr>
+</p:sld>
+</file>
+
+<file path=ppt/slides/slide2.xml><?xml version="1.0" encoding="utf-8"?>
+<p:sld xmlns:a="http://schemas.openxmlformats.org/drawingml/2006/main" xmlns:r="http://schemas.openxmlformats.org/officeDocument/2006/relationships" xmlns:p="http://schemas.openxmlformats.org/presentationml/2006/main">
+  <p:cSld>
+    <p:spTree>
+      <p:nvGrpSpPr>
+        <p:cNvPr id="1" name=""/>
+        <p:cNvGrpSpPr/>
+        <p:nvPr/>
+      </p:nvGrpSpPr>
+      <p:grpSpPr>
+        <a:xfrm>
+          <a:off x="0" y="0"/>
+          <a:ext cx="0" cy="0"/>
+          <a:chOff x="0" y="0"/>
+          <a:chExt cx="0" cy="0"/>
+        </a:xfrm>
+      </p:grpSpPr>
+      <p:sp>
+        <p:nvSpPr>
+          <p:cNvPr id="4" name="Text Placeholder 3">
+            <a:extLst>
+              <a:ext uri="{FF2B5EF4-FFF2-40B4-BE49-F238E27FC236}">
+                <a16:creationId xmlns:a16="http://schemas.microsoft.com/office/drawing/2014/main" id="{D315EB61-2206-9E8D-A734-C38BFA2E2FD1}"/>
+              </a:ext>
+            </a:extLst>
+          </p:cNvPr>
+          <p:cNvSpPr>
+            <a:spLocks noGrp="1"/>
+          </p:cNvSpPr>
+          <p:nvPr>
+            <p:ph type="body" sz="quarter" idx="32"/>
+          </p:nvPr>
+        </p:nvSpPr>
+        <p:spPr>
+          <a:xfrm>
+            <a:off x="230124" y="1088136"/>
+            <a:ext cx="1208897" cy="302186"/>
+          </a:xfrm>
+        </p:spPr>
+        <p:txBody>
+          <a:bodyPr/>
+          <a:lstStyle/>
+          <a:p>
+            <a:endParaRPr lang="en-AU"/>
+          </a:p>
+        </p:txBody>
+      </p:sp>
+      <p:sp>
+        <p:nvSpPr>
+          <p:cNvPr id="5" name="Text Placeholder 4">
+            <a:extLst>
+              <a:ext uri="{FF2B5EF4-FFF2-40B4-BE49-F238E27FC236}">
+                <a16:creationId xmlns:a16="http://schemas.microsoft.com/office/drawing/2014/main" id="{BFA6068F-D1D0-4E74-27A2-E29EEFF1F82B}"/>
+              </a:ext>
+            </a:extLst>
+          </p:cNvPr>
+          <p:cNvSpPr>
+            <a:spLocks noGrp="1"/>
+          </p:cNvSpPr>
+          <p:nvPr>
+            <p:ph type="body" sz="quarter" idx="33"/>
+          </p:nvPr>
+        </p:nvSpPr>
+        <p:spPr>
+          <a:xfrm>
+            <a:off x="230124" y="1559792"/>
+            <a:ext cx="11731752" cy="4979031"/>
+          </a:xfrm>
+        </p:spPr>
+        <p:txBody>
+          <a:bodyPr/>
+          <a:lstStyle/>
+          <a:p>
+            <a:r>
+              <a:rPr lang="en-AU" dirty="0"/>
+              <a:t>Datasets Sourced From - https://explore.data.abs.gov.au/</a:t>
+            </a:r>
+          </a:p>
+        </p:txBody>
+      </p:sp>
+      <p:sp>
+        <p:nvSpPr>
+          <p:cNvPr id="18" name="Title 17">
+            <a:extLst>
+              <a:ext uri="{FF2B5EF4-FFF2-40B4-BE49-F238E27FC236}">
+                <a16:creationId xmlns:a16="http://schemas.microsoft.com/office/drawing/2014/main" id="{DF78A5DC-D443-B9C8-9D1A-E011F27D286B}"/>
+              </a:ext>
+            </a:extLst>
+          </p:cNvPr>
+          <p:cNvSpPr>
+            <a:spLocks noGrp="1"/>
+          </p:cNvSpPr>
+          <p:nvPr>
+            <p:ph type="title"/>
+          </p:nvPr>
+        </p:nvSpPr>
+        <p:spPr/>
+        <p:txBody>
+          <a:bodyPr/>
+          <a:lstStyle/>
+          <a:p>
+            <a:r>
+              <a:rPr lang="en-AU" dirty="0">
+                <a:solidFill>
+                  <a:srgbClr val="4C5DBA"/>
+                </a:solidFill>
+              </a:rPr>
+              <a:t>extract</a:t>
+            </a:r>
+          </a:p>
+        </p:txBody>
+      </p:sp>
+    </p:spTree>
+    <p:extLst>
+      <p:ext uri="{BB962C8B-B14F-4D97-AF65-F5344CB8AC3E}">
+        <p14:creationId xmlns:p14="http://schemas.microsoft.com/office/powerpoint/2010/main" val="2669216245"/>
+      </p:ext>
+    </p:extLst>
+  </p:cSld>
+  <p:clrMapOvr>
+    <a:masterClrMapping/>
+  </p:clrMapOvr>
+</p:sld>
+</file>
+
+<file path=ppt/slides/slide3.xml><?xml version="1.0" encoding="utf-8"?>
+<p:sld xmlns:a="http://schemas.openxmlformats.org/drawingml/2006/main" xmlns:r="http://schemas.openxmlformats.org/officeDocument/2006/relationships" xmlns:p="http://schemas.openxmlformats.org/presentationml/2006/main">
+  <p:cSld>
+    <p:spTree>
+      <p:nvGrpSpPr>
+        <p:cNvPr id="1" name=""/>
+        <p:cNvGrpSpPr/>
+        <p:nvPr/>
+      </p:nvGrpSpPr>
+      <p:grpSpPr>
+        <a:xfrm>
+          <a:off x="0" y="0"/>
+          <a:ext cx="0" cy="0"/>
+          <a:chOff x="0" y="0"/>
+          <a:chExt cx="0" cy="0"/>
+        </a:xfrm>
+      </p:grpSpPr>
+      <p:sp>
+        <p:nvSpPr>
+          <p:cNvPr id="4" name="Text Placeholder 3">
+            <a:extLst>
+              <a:ext uri="{FF2B5EF4-FFF2-40B4-BE49-F238E27FC236}">
+                <a16:creationId xmlns:a16="http://schemas.microsoft.com/office/drawing/2014/main" id="{08C6C131-4F19-305C-A1E7-5EB27E260B70}"/>
+              </a:ext>
+            </a:extLst>
+          </p:cNvPr>
+          <p:cNvSpPr>
+            <a:spLocks noGrp="1"/>
+          </p:cNvSpPr>
+          <p:nvPr>
+            <p:ph type="body" sz="quarter" idx="32"/>
+          </p:nvPr>
+        </p:nvSpPr>
+        <p:spPr>
+          <a:xfrm>
+            <a:off x="571021" y="1088136"/>
+            <a:ext cx="11138529" cy="471656"/>
+          </a:xfrm>
+        </p:spPr>
+        <p:txBody>
+          <a:bodyPr/>
+          <a:lstStyle/>
+          <a:p>
+            <a:r>
+              <a:rPr lang="en-AU" dirty="0"/>
+              <a:t>REQUIRED STEPS TO TRANSFORM DATA;</a:t>
+            </a:r>
+          </a:p>
+        </p:txBody>
+      </p:sp>
+      <p:sp>
+        <p:nvSpPr>
+          <p:cNvPr id="5" name="Text Placeholder 4">
+            <a:extLst>
+              <a:ext uri="{FF2B5EF4-FFF2-40B4-BE49-F238E27FC236}">
+                <a16:creationId xmlns:a16="http://schemas.microsoft.com/office/drawing/2014/main" id="{9469B1AE-69A4-A94E-FC92-03DD4F06EB6A}"/>
+              </a:ext>
+            </a:extLst>
+          </p:cNvPr>
+          <p:cNvSpPr>
+            <a:spLocks noGrp="1"/>
+          </p:cNvSpPr>
+          <p:nvPr>
+            <p:ph type="body" sz="quarter" idx="33"/>
+          </p:nvPr>
+        </p:nvSpPr>
+        <p:spPr>
+          <a:xfrm>
+            <a:off x="571021" y="1559791"/>
+            <a:ext cx="5524980" cy="1597477"/>
+          </a:xfrm>
+        </p:spPr>
+        <p:txBody>
+          <a:bodyPr/>
+          <a:lstStyle/>
+          <a:p>
+            <a:r>
+              <a:rPr lang="en-AU" dirty="0"/>
+              <a:t>File A - </a:t>
+            </a:r>
+            <a:r>
+              <a:rPr lang="en-US" b="1" dirty="0"/>
+              <a:t>ABS – AWE.CSV 27K datapoints</a:t>
+            </a:r>
+            <a:endParaRPr lang="en-AU" b="1" dirty="0"/>
+          </a:p>
+          <a:p>
+            <a:pPr marL="171450" indent="-171450">
+              <a:buFont typeface="Arial" panose="020B0604020202020204" pitchFamily="34" charset="0"/>
+              <a:buChar char="•"/>
+            </a:pPr>
+            <a:r>
+              <a:rPr lang="en-AU" dirty="0"/>
+              <a:t>Filter column C values to only include ‘Earnings’</a:t>
+            </a:r>
+          </a:p>
+          <a:p>
+            <a:pPr marL="171450" indent="-171450">
+              <a:buFont typeface="Arial" panose="020B0604020202020204" pitchFamily="34" charset="0"/>
+              <a:buChar char="•"/>
+            </a:pPr>
+            <a:r>
+              <a:rPr lang="en-US" dirty="0"/>
+              <a:t>Filter column B to only include 'All employees average weekly earnings’</a:t>
+            </a:r>
+          </a:p>
+          <a:p>
+            <a:pPr marL="171450" indent="-171450">
+              <a:buFont typeface="Arial" panose="020B0604020202020204" pitchFamily="34" charset="0"/>
+              <a:buChar char="•"/>
+            </a:pPr>
+            <a:r>
+              <a:rPr lang="en-US" dirty="0"/>
+              <a:t>Filter column G to only include ‘Original’</a:t>
+            </a:r>
+          </a:p>
+          <a:p>
+            <a:pPr marL="171450" indent="-171450">
+              <a:buFont typeface="Arial" panose="020B0604020202020204" pitchFamily="34" charset="0"/>
+              <a:buChar char="•"/>
+            </a:pPr>
+            <a:r>
+              <a:rPr lang="en-US" dirty="0"/>
+              <a:t>Copy columns to </a:t>
+            </a:r>
+            <a:r>
+              <a:rPr lang="en-US" dirty="0" err="1"/>
+              <a:t>DataFrame</a:t>
+            </a:r>
+            <a:r>
+              <a:rPr lang="en-US" dirty="0"/>
+              <a:t> - REGION: Region, TIME_PERIOD: Time Period, OBS_VALUE</a:t>
+            </a:r>
+            <a:endParaRPr lang="en-AU" dirty="0"/>
+          </a:p>
+        </p:txBody>
+      </p:sp>
+      <p:sp>
+        <p:nvSpPr>
+          <p:cNvPr id="18" name="Title 17">
+            <a:extLst>
+              <a:ext uri="{FF2B5EF4-FFF2-40B4-BE49-F238E27FC236}">
+                <a16:creationId xmlns:a16="http://schemas.microsoft.com/office/drawing/2014/main" id="{C974036A-2C9E-2E95-3C84-CA04C103116F}"/>
+              </a:ext>
+            </a:extLst>
+          </p:cNvPr>
+          <p:cNvSpPr>
+            <a:spLocks noGrp="1"/>
+          </p:cNvSpPr>
+          <p:nvPr>
+            <p:ph type="title"/>
+          </p:nvPr>
+        </p:nvSpPr>
+        <p:spPr/>
+        <p:txBody>
+          <a:bodyPr/>
+          <a:lstStyle/>
+          <a:p>
+            <a:r>
+              <a:rPr lang="en-AU" dirty="0">
+                <a:solidFill>
+                  <a:srgbClr val="00B0F0"/>
+                </a:solidFill>
+              </a:rPr>
+              <a:t>transform</a:t>
+            </a:r>
+          </a:p>
+        </p:txBody>
+      </p:sp>
+      <p:sp>
+        <p:nvSpPr>
+          <p:cNvPr id="19" name="Text Placeholder 4">
+            <a:extLst>
+              <a:ext uri="{FF2B5EF4-FFF2-40B4-BE49-F238E27FC236}">
+                <a16:creationId xmlns:a16="http://schemas.microsoft.com/office/drawing/2014/main" id="{5E63775D-7A23-16BD-5052-689A5F3D3512}"/>
               </a:ext>
             </a:extLst>
           </p:cNvPr>
@@ -5468,32 +5763,32 @@
         </p:nvSpPr>
         <p:spPr>
           <a:xfrm>
-            <a:off x="10278281" y="3077030"/>
-            <a:ext cx="1796396" cy="302186"/>
+            <a:off x="6095999" y="1556915"/>
+            <a:ext cx="5696309" cy="1597477"/>
           </a:xfrm>
           <a:prstGeom prst="rect">
             <a:avLst/>
           </a:prstGeom>
         </p:spPr>
         <p:txBody>
-          <a:bodyPr vert="horz" lIns="91440" tIns="45720" rIns="91440" bIns="45720" rtlCol="0">
+          <a:bodyPr vert="horz" lIns="0" tIns="45720" rIns="0" bIns="45720" rtlCol="0">
             <a:noAutofit/>
           </a:bodyPr>
           <a:lstStyle>
             <a:lvl1pPr marL="0" indent="0" algn="l" defTabSz="914400" rtl="0" eaLnBrk="1" latinLnBrk="0" hangingPunct="1">
               <a:lnSpc>
-                <a:spcPct val="90000"/>
+                <a:spcPct val="100000"/>
               </a:lnSpc>
               <a:spcBef>
                 <a:spcPts val="1000"/>
               </a:spcBef>
               <a:buFont typeface="Arial" panose="020B0604020202020204" pitchFamily="34" charset="0"/>
               <a:buNone/>
-              <a:defRPr sz="2000" b="1" kern="1200">
+              <a:defRPr sz="1100" kern="1200">
                 <a:solidFill>
-                  <a:schemeClr val="accent3"/>
+                  <a:schemeClr val="tx1"/>
                 </a:solidFill>
-                <a:latin typeface="+mj-lt"/>
+                <a:latin typeface="+mn-lt"/>
                 <a:ea typeface="+mn-ea"/>
                 <a:cs typeface="+mn-cs"/>
               </a:defRPr>
@@ -5507,7 +5802,7 @@
               </a:spcBef>
               <a:buFont typeface="Arial" panose="020B0604020202020204" pitchFamily="34" charset="0"/>
               <a:buNone/>
-              <a:defRPr sz="1800" kern="1200">
+              <a:defRPr sz="1100" kern="1200">
                 <a:solidFill>
                   <a:schemeClr val="tx1"/>
                 </a:solidFill>
@@ -5525,7 +5820,7 @@
               </a:spcBef>
               <a:buFont typeface="Arial" panose="020B0604020202020204" pitchFamily="34" charset="0"/>
               <a:buNone/>
-              <a:defRPr sz="1800" kern="1200">
+              <a:defRPr sz="1100" kern="1200">
                 <a:solidFill>
                   <a:schemeClr val="tx1"/>
                 </a:solidFill>
@@ -5543,7 +5838,7 @@
               </a:spcBef>
               <a:buFont typeface="Arial" panose="020B0604020202020204" pitchFamily="34" charset="0"/>
               <a:buNone/>
-              <a:defRPr sz="1800" kern="1200">
+              <a:defRPr sz="1100" kern="1200">
                 <a:solidFill>
                   <a:schemeClr val="tx1"/>
                 </a:solidFill>
@@ -5561,7 +5856,7 @@
               </a:spcBef>
               <a:buFont typeface="Arial" panose="020B0604020202020204" pitchFamily="34" charset="0"/>
               <a:buNone/>
-              <a:defRPr sz="1800" kern="1200">
+              <a:defRPr sz="1100" kern="1200">
                 <a:solidFill>
                   <a:schemeClr val="tx1"/>
                 </a:solidFill>
@@ -5645,227 +5940,674 @@
           </a:lstStyle>
           <a:p>
             <a:r>
+              <a:rPr lang="en-AU" dirty="0"/>
+              <a:t>File B - </a:t>
+            </a:r>
+            <a:r>
+              <a:rPr lang="en-US" b="1" dirty="0"/>
+              <a:t>ABS – ERP.CSV 7,5K datapoints</a:t>
+            </a:r>
+            <a:endParaRPr lang="en-AU" b="1" dirty="0"/>
+          </a:p>
+          <a:p>
+            <a:pPr marL="171450" indent="-171450">
+              <a:buFont typeface="Arial" panose="020B0604020202020204" pitchFamily="34" charset="0"/>
+              <a:buChar char="•"/>
+            </a:pPr>
+            <a:r>
               <a:rPr lang="en-US" dirty="0"/>
-              <a:t>Table Elements</a:t>
-            </a:r>
-          </a:p>
-        </p:txBody>
-      </p:sp>
-      <p:sp>
-        <p:nvSpPr>
-          <p:cNvPr id="27" name="Text Placeholder 23">
-            <a:extLst>
-              <a:ext uri="{FF2B5EF4-FFF2-40B4-BE49-F238E27FC236}">
-                <a16:creationId xmlns:a16="http://schemas.microsoft.com/office/drawing/2014/main" id="{A7B1A7A7-6044-4BEA-B2F3-E954FA96F442}"/>
-              </a:ext>
-            </a:extLst>
-          </p:cNvPr>
-          <p:cNvSpPr txBox="1">
-            <a:spLocks/>
-          </p:cNvSpPr>
+              <a:t>Filter column B to only include ‘4: Internal Arrivals’, ‘5: Internal Departures’, ‘6: Net Internal Migration’, ‘13: Change Over Previous Quarter’</a:t>
+            </a:r>
+          </a:p>
+          <a:p>
+            <a:pPr marL="171450" indent="-171450">
+              <a:buFont typeface="Arial" panose="020B0604020202020204" pitchFamily="34" charset="0"/>
+              <a:buChar char="•"/>
+            </a:pPr>
+            <a:r>
+              <a:rPr lang="en-US" dirty="0"/>
+              <a:t>Filter column G to only include ‘Original’</a:t>
+            </a:r>
+          </a:p>
+          <a:p>
+            <a:pPr marL="171450" indent="-171450">
+              <a:buFont typeface="Arial" panose="020B0604020202020204" pitchFamily="34" charset="0"/>
+              <a:buChar char="•"/>
+            </a:pPr>
+            <a:r>
+              <a:rPr lang="en-US" dirty="0"/>
+              <a:t>Copy columns to </a:t>
+            </a:r>
+            <a:r>
+              <a:rPr lang="en-US" dirty="0" err="1"/>
+              <a:t>DataFrame</a:t>
+            </a:r>
+            <a:r>
+              <a:rPr lang="en-US" dirty="0"/>
+              <a:t> - REGION: Region, TIME_PERIOD: Time Period, OBS_VALUE</a:t>
+            </a:r>
+            <a:endParaRPr lang="en-AU" dirty="0"/>
+          </a:p>
+        </p:txBody>
+      </p:sp>
+    </p:spTree>
+    <p:extLst>
+      <p:ext uri="{BB962C8B-B14F-4D97-AF65-F5344CB8AC3E}">
+        <p14:creationId xmlns:p14="http://schemas.microsoft.com/office/powerpoint/2010/main" val="1982263601"/>
+      </p:ext>
+    </p:extLst>
+  </p:cSld>
+  <p:clrMapOvr>
+    <a:masterClrMapping/>
+  </p:clrMapOvr>
+</p:sld>
+</file>
+
+<file path=ppt/slides/slide4.xml><?xml version="1.0" encoding="utf-8"?>
+<p:sld xmlns:a="http://schemas.openxmlformats.org/drawingml/2006/main" xmlns:r="http://schemas.openxmlformats.org/officeDocument/2006/relationships" xmlns:p="http://schemas.openxmlformats.org/presentationml/2006/main">
+  <p:cSld>
+    <p:spTree>
+      <p:nvGrpSpPr>
+        <p:cNvPr id="1" name=""/>
+        <p:cNvGrpSpPr/>
+        <p:nvPr/>
+      </p:nvGrpSpPr>
+      <p:grpSpPr>
+        <a:xfrm>
+          <a:off x="0" y="0"/>
+          <a:ext cx="0" cy="0"/>
+          <a:chOff x="0" y="0"/>
+          <a:chExt cx="0" cy="0"/>
+        </a:xfrm>
+      </p:grpSpPr>
+      <p:sp>
+        <p:nvSpPr>
+          <p:cNvPr id="2" name="Text Placeholder 1">
+            <a:extLst>
+              <a:ext uri="{FF2B5EF4-FFF2-40B4-BE49-F238E27FC236}">
+                <a16:creationId xmlns:a16="http://schemas.microsoft.com/office/drawing/2014/main" id="{3B330F55-1E0C-84B6-1179-A3D8AC9B76A3}"/>
+              </a:ext>
+            </a:extLst>
+          </p:cNvPr>
+          <p:cNvSpPr>
+            <a:spLocks noGrp="1"/>
+          </p:cNvSpPr>
+          <p:nvPr>
+            <p:ph type="body" sz="quarter" idx="10"/>
+          </p:nvPr>
+        </p:nvSpPr>
+        <p:spPr/>
+        <p:txBody>
+          <a:bodyPr/>
+          <a:lstStyle/>
+          <a:p>
+            <a:endParaRPr lang="en-AU"/>
+          </a:p>
+        </p:txBody>
+      </p:sp>
+      <p:sp>
+        <p:nvSpPr>
+          <p:cNvPr id="3" name="Text Placeholder 2">
+            <a:extLst>
+              <a:ext uri="{FF2B5EF4-FFF2-40B4-BE49-F238E27FC236}">
+                <a16:creationId xmlns:a16="http://schemas.microsoft.com/office/drawing/2014/main" id="{00EBD3A1-6EF3-1C86-8945-5A4EDE170C29}"/>
+              </a:ext>
+            </a:extLst>
+          </p:cNvPr>
+          <p:cNvSpPr>
+            <a:spLocks noGrp="1"/>
+          </p:cNvSpPr>
+          <p:nvPr>
+            <p:ph type="body" sz="quarter" idx="11"/>
+          </p:nvPr>
+        </p:nvSpPr>
+        <p:spPr/>
+        <p:txBody>
+          <a:bodyPr/>
+          <a:lstStyle/>
+          <a:p>
+            <a:endParaRPr lang="en-AU"/>
+          </a:p>
+        </p:txBody>
+      </p:sp>
+      <p:sp>
+        <p:nvSpPr>
+          <p:cNvPr id="4" name="Text Placeholder 3">
+            <a:extLst>
+              <a:ext uri="{FF2B5EF4-FFF2-40B4-BE49-F238E27FC236}">
+                <a16:creationId xmlns:a16="http://schemas.microsoft.com/office/drawing/2014/main" id="{3EA43DCB-E7A0-4578-8C0D-AE87E1064A61}"/>
+              </a:ext>
+            </a:extLst>
+          </p:cNvPr>
+          <p:cNvSpPr>
+            <a:spLocks noGrp="1"/>
+          </p:cNvSpPr>
+          <p:nvPr>
+            <p:ph type="body" sz="quarter" idx="32"/>
+          </p:nvPr>
+        </p:nvSpPr>
+        <p:spPr/>
+        <p:txBody>
+          <a:bodyPr/>
+          <a:lstStyle/>
+          <a:p>
+            <a:endParaRPr lang="en-AU"/>
+          </a:p>
+        </p:txBody>
+      </p:sp>
+      <p:sp>
+        <p:nvSpPr>
+          <p:cNvPr id="5" name="Text Placeholder 4">
+            <a:extLst>
+              <a:ext uri="{FF2B5EF4-FFF2-40B4-BE49-F238E27FC236}">
+                <a16:creationId xmlns:a16="http://schemas.microsoft.com/office/drawing/2014/main" id="{4E80059F-CC09-F37B-27B0-C44959662C52}"/>
+              </a:ext>
+            </a:extLst>
+          </p:cNvPr>
+          <p:cNvSpPr>
+            <a:spLocks noGrp="1"/>
+          </p:cNvSpPr>
+          <p:nvPr>
+            <p:ph type="body" sz="quarter" idx="33"/>
+          </p:nvPr>
+        </p:nvSpPr>
+        <p:spPr/>
+        <p:txBody>
+          <a:bodyPr/>
+          <a:lstStyle/>
+          <a:p>
+            <a:endParaRPr lang="en-AU"/>
+          </a:p>
+        </p:txBody>
+      </p:sp>
+      <p:sp>
+        <p:nvSpPr>
+          <p:cNvPr id="6" name="Text Placeholder 5">
+            <a:extLst>
+              <a:ext uri="{FF2B5EF4-FFF2-40B4-BE49-F238E27FC236}">
+                <a16:creationId xmlns:a16="http://schemas.microsoft.com/office/drawing/2014/main" id="{32B7EF5A-9F99-E0EB-65C7-F790DE8A0B0E}"/>
+              </a:ext>
+            </a:extLst>
+          </p:cNvPr>
+          <p:cNvSpPr>
+            <a:spLocks noGrp="1"/>
+          </p:cNvSpPr>
+          <p:nvPr>
+            <p:ph type="body" sz="quarter" idx="34"/>
+          </p:nvPr>
+        </p:nvSpPr>
+        <p:spPr/>
+        <p:txBody>
+          <a:bodyPr/>
+          <a:lstStyle/>
+          <a:p>
+            <a:endParaRPr lang="en-AU"/>
+          </a:p>
+        </p:txBody>
+      </p:sp>
+      <p:sp>
+        <p:nvSpPr>
+          <p:cNvPr id="7" name="Text Placeholder 6">
+            <a:extLst>
+              <a:ext uri="{FF2B5EF4-FFF2-40B4-BE49-F238E27FC236}">
+                <a16:creationId xmlns:a16="http://schemas.microsoft.com/office/drawing/2014/main" id="{9BCCC386-198F-15FD-C9E5-8FA3ECED2617}"/>
+              </a:ext>
+            </a:extLst>
+          </p:cNvPr>
+          <p:cNvSpPr>
+            <a:spLocks noGrp="1"/>
+          </p:cNvSpPr>
+          <p:nvPr>
+            <p:ph type="body" sz="quarter" idx="35"/>
+          </p:nvPr>
+        </p:nvSpPr>
+        <p:spPr/>
+        <p:txBody>
+          <a:bodyPr/>
+          <a:lstStyle/>
+          <a:p>
+            <a:endParaRPr lang="en-AU"/>
+          </a:p>
+        </p:txBody>
+      </p:sp>
+      <p:sp>
+        <p:nvSpPr>
+          <p:cNvPr id="8" name="Text Placeholder 7">
+            <a:extLst>
+              <a:ext uri="{FF2B5EF4-FFF2-40B4-BE49-F238E27FC236}">
+                <a16:creationId xmlns:a16="http://schemas.microsoft.com/office/drawing/2014/main" id="{9FC16DD6-4CF4-1034-7B15-27C0EBFAAE78}"/>
+              </a:ext>
+            </a:extLst>
+          </p:cNvPr>
+          <p:cNvSpPr>
+            <a:spLocks noGrp="1"/>
+          </p:cNvSpPr>
+          <p:nvPr>
+            <p:ph type="body" sz="quarter" idx="36"/>
+          </p:nvPr>
+        </p:nvSpPr>
+        <p:spPr/>
+        <p:txBody>
+          <a:bodyPr/>
+          <a:lstStyle/>
+          <a:p>
+            <a:endParaRPr lang="en-AU"/>
+          </a:p>
+        </p:txBody>
+      </p:sp>
+      <p:sp>
+        <p:nvSpPr>
+          <p:cNvPr id="9" name="Text Placeholder 8">
+            <a:extLst>
+              <a:ext uri="{FF2B5EF4-FFF2-40B4-BE49-F238E27FC236}">
+                <a16:creationId xmlns:a16="http://schemas.microsoft.com/office/drawing/2014/main" id="{F3CDF25B-42A6-82DF-635D-7F182868BC54}"/>
+              </a:ext>
+            </a:extLst>
+          </p:cNvPr>
+          <p:cNvSpPr>
+            <a:spLocks noGrp="1"/>
+          </p:cNvSpPr>
+          <p:nvPr>
+            <p:ph type="body" sz="quarter" idx="37"/>
+          </p:nvPr>
+        </p:nvSpPr>
+        <p:spPr/>
+        <p:txBody>
+          <a:bodyPr/>
+          <a:lstStyle/>
+          <a:p>
+            <a:endParaRPr lang="en-AU"/>
+          </a:p>
+        </p:txBody>
+      </p:sp>
+      <p:sp>
+        <p:nvSpPr>
+          <p:cNvPr id="10" name="Text Placeholder 9">
+            <a:extLst>
+              <a:ext uri="{FF2B5EF4-FFF2-40B4-BE49-F238E27FC236}">
+                <a16:creationId xmlns:a16="http://schemas.microsoft.com/office/drawing/2014/main" id="{6EFCB200-CC76-54D5-5D41-EF23CE8A20ED}"/>
+              </a:ext>
+            </a:extLst>
+          </p:cNvPr>
+          <p:cNvSpPr>
+            <a:spLocks noGrp="1"/>
+          </p:cNvSpPr>
+          <p:nvPr>
+            <p:ph type="body" sz="quarter" idx="38"/>
+          </p:nvPr>
+        </p:nvSpPr>
+        <p:spPr/>
+        <p:txBody>
+          <a:bodyPr/>
+          <a:lstStyle/>
+          <a:p>
+            <a:endParaRPr lang="en-AU"/>
+          </a:p>
+        </p:txBody>
+      </p:sp>
+      <p:sp>
+        <p:nvSpPr>
+          <p:cNvPr id="11" name="Text Placeholder 10">
+            <a:extLst>
+              <a:ext uri="{FF2B5EF4-FFF2-40B4-BE49-F238E27FC236}">
+                <a16:creationId xmlns:a16="http://schemas.microsoft.com/office/drawing/2014/main" id="{A685A1DE-E855-53E9-985B-933424523BA4}"/>
+              </a:ext>
+            </a:extLst>
+          </p:cNvPr>
+          <p:cNvSpPr>
+            <a:spLocks noGrp="1"/>
+          </p:cNvSpPr>
+          <p:nvPr>
+            <p:ph type="body" sz="quarter" idx="39"/>
+          </p:nvPr>
+        </p:nvSpPr>
+        <p:spPr/>
+        <p:txBody>
+          <a:bodyPr/>
+          <a:lstStyle/>
+          <a:p>
+            <a:endParaRPr lang="en-AU"/>
+          </a:p>
+        </p:txBody>
+      </p:sp>
+      <p:sp>
+        <p:nvSpPr>
+          <p:cNvPr id="12" name="Text Placeholder 11">
+            <a:extLst>
+              <a:ext uri="{FF2B5EF4-FFF2-40B4-BE49-F238E27FC236}">
+                <a16:creationId xmlns:a16="http://schemas.microsoft.com/office/drawing/2014/main" id="{5E70B6B3-BC5E-3391-16CD-48E888CCDC43}"/>
+              </a:ext>
+            </a:extLst>
+          </p:cNvPr>
+          <p:cNvSpPr>
+            <a:spLocks noGrp="1"/>
+          </p:cNvSpPr>
+          <p:nvPr>
+            <p:ph type="body" sz="quarter" idx="40"/>
+          </p:nvPr>
+        </p:nvSpPr>
+        <p:spPr/>
+        <p:txBody>
+          <a:bodyPr/>
+          <a:lstStyle/>
+          <a:p>
+            <a:endParaRPr lang="en-AU"/>
+          </a:p>
+        </p:txBody>
+      </p:sp>
+      <p:sp>
+        <p:nvSpPr>
+          <p:cNvPr id="13" name="Text Placeholder 12">
+            <a:extLst>
+              <a:ext uri="{FF2B5EF4-FFF2-40B4-BE49-F238E27FC236}">
+                <a16:creationId xmlns:a16="http://schemas.microsoft.com/office/drawing/2014/main" id="{6049D956-DC8B-7829-076A-0E68B6323DC0}"/>
+              </a:ext>
+            </a:extLst>
+          </p:cNvPr>
+          <p:cNvSpPr>
+            <a:spLocks noGrp="1"/>
+          </p:cNvSpPr>
+          <p:nvPr>
+            <p:ph type="body" sz="quarter" idx="41"/>
+          </p:nvPr>
+        </p:nvSpPr>
+        <p:spPr/>
+        <p:txBody>
+          <a:bodyPr/>
+          <a:lstStyle/>
+          <a:p>
+            <a:endParaRPr lang="en-AU"/>
+          </a:p>
+        </p:txBody>
+      </p:sp>
+      <p:sp>
+        <p:nvSpPr>
+          <p:cNvPr id="14" name="Text Placeholder 13">
+            <a:extLst>
+              <a:ext uri="{FF2B5EF4-FFF2-40B4-BE49-F238E27FC236}">
+                <a16:creationId xmlns:a16="http://schemas.microsoft.com/office/drawing/2014/main" id="{9424BB0A-5A04-D804-7EA7-E30020297B78}"/>
+              </a:ext>
+            </a:extLst>
+          </p:cNvPr>
+          <p:cNvSpPr>
+            <a:spLocks noGrp="1"/>
+          </p:cNvSpPr>
+          <p:nvPr>
+            <p:ph type="body" sz="quarter" idx="42"/>
+          </p:nvPr>
+        </p:nvSpPr>
+        <p:spPr/>
+        <p:txBody>
+          <a:bodyPr/>
+          <a:lstStyle/>
+          <a:p>
+            <a:endParaRPr lang="en-AU"/>
+          </a:p>
+        </p:txBody>
+      </p:sp>
+      <p:sp>
+        <p:nvSpPr>
+          <p:cNvPr id="15" name="Text Placeholder 14">
+            <a:extLst>
+              <a:ext uri="{FF2B5EF4-FFF2-40B4-BE49-F238E27FC236}">
+                <a16:creationId xmlns:a16="http://schemas.microsoft.com/office/drawing/2014/main" id="{8C3C7069-6660-871A-05B8-9A2004A1C6E8}"/>
+              </a:ext>
+            </a:extLst>
+          </p:cNvPr>
+          <p:cNvSpPr>
+            <a:spLocks noGrp="1"/>
+          </p:cNvSpPr>
+          <p:nvPr>
+            <p:ph type="body" sz="quarter" idx="43"/>
+          </p:nvPr>
+        </p:nvSpPr>
+        <p:spPr/>
+        <p:txBody>
+          <a:bodyPr/>
+          <a:lstStyle/>
+          <a:p>
+            <a:endParaRPr lang="en-AU"/>
+          </a:p>
+        </p:txBody>
+      </p:sp>
+      <p:sp>
+        <p:nvSpPr>
+          <p:cNvPr id="16" name="Text Placeholder 15">
+            <a:extLst>
+              <a:ext uri="{FF2B5EF4-FFF2-40B4-BE49-F238E27FC236}">
+                <a16:creationId xmlns:a16="http://schemas.microsoft.com/office/drawing/2014/main" id="{F15FB35C-46F0-D7C0-F8EF-930723B3DC53}"/>
+              </a:ext>
+            </a:extLst>
+          </p:cNvPr>
+          <p:cNvSpPr>
+            <a:spLocks noGrp="1"/>
+          </p:cNvSpPr>
+          <p:nvPr>
+            <p:ph type="body" sz="quarter" idx="44"/>
+          </p:nvPr>
+        </p:nvSpPr>
+        <p:spPr/>
+        <p:txBody>
+          <a:bodyPr/>
+          <a:lstStyle/>
+          <a:p>
+            <a:endParaRPr lang="en-AU"/>
+          </a:p>
+        </p:txBody>
+      </p:sp>
+      <p:sp>
+        <p:nvSpPr>
+          <p:cNvPr id="17" name="Text Placeholder 16">
+            <a:extLst>
+              <a:ext uri="{FF2B5EF4-FFF2-40B4-BE49-F238E27FC236}">
+                <a16:creationId xmlns:a16="http://schemas.microsoft.com/office/drawing/2014/main" id="{F2D32BB4-573F-E15B-DFCF-94A020AA14F7}"/>
+              </a:ext>
+            </a:extLst>
+          </p:cNvPr>
+          <p:cNvSpPr>
+            <a:spLocks noGrp="1"/>
+          </p:cNvSpPr>
+          <p:nvPr>
+            <p:ph type="body" sz="quarter" idx="45"/>
+          </p:nvPr>
+        </p:nvSpPr>
+        <p:spPr/>
+        <p:txBody>
+          <a:bodyPr/>
+          <a:lstStyle/>
+          <a:p>
+            <a:endParaRPr lang="en-AU"/>
+          </a:p>
+        </p:txBody>
+      </p:sp>
+      <p:sp>
+        <p:nvSpPr>
+          <p:cNvPr id="18" name="Title 17">
+            <a:extLst>
+              <a:ext uri="{FF2B5EF4-FFF2-40B4-BE49-F238E27FC236}">
+                <a16:creationId xmlns:a16="http://schemas.microsoft.com/office/drawing/2014/main" id="{B6B4CFD8-1240-704E-2C76-FA078A62ACB8}"/>
+              </a:ext>
+            </a:extLst>
+          </p:cNvPr>
+          <p:cNvSpPr>
+            <a:spLocks noGrp="1"/>
+          </p:cNvSpPr>
+          <p:nvPr>
+            <p:ph type="title"/>
+          </p:nvPr>
+        </p:nvSpPr>
+        <p:spPr/>
+        <p:txBody>
+          <a:bodyPr/>
+          <a:lstStyle/>
+          <a:p>
+            <a:r>
+              <a:rPr lang="en-AU" dirty="0">
+                <a:solidFill>
+                  <a:srgbClr val="A5DAC6"/>
+                </a:solidFill>
+              </a:rPr>
+              <a:t>load</a:t>
+            </a:r>
+          </a:p>
+        </p:txBody>
+      </p:sp>
+    </p:spTree>
+    <p:extLst>
+      <p:ext uri="{BB962C8B-B14F-4D97-AF65-F5344CB8AC3E}">
+        <p14:creationId xmlns:p14="http://schemas.microsoft.com/office/powerpoint/2010/main" val="1357195740"/>
+      </p:ext>
+    </p:extLst>
+  </p:cSld>
+  <p:clrMapOvr>
+    <a:masterClrMapping/>
+  </p:clrMapOvr>
+</p:sld>
+</file>
+
+<file path=ppt/slides/slide5.xml><?xml version="1.0" encoding="utf-8"?>
+<p:sld xmlns:a="http://schemas.openxmlformats.org/drawingml/2006/main" xmlns:r="http://schemas.openxmlformats.org/officeDocument/2006/relationships" xmlns:p="http://schemas.openxmlformats.org/presentationml/2006/main">
+  <p:cSld>
+    <p:spTree>
+      <p:nvGrpSpPr>
+        <p:cNvPr id="1" name=""/>
+        <p:cNvGrpSpPr/>
+        <p:nvPr/>
+      </p:nvGrpSpPr>
+      <p:grpSpPr>
+        <a:xfrm>
+          <a:off x="0" y="0"/>
+          <a:ext cx="0" cy="0"/>
+          <a:chOff x="0" y="0"/>
+          <a:chExt cx="0" cy="0"/>
+        </a:xfrm>
+      </p:grpSpPr>
+      <p:sp>
+        <p:nvSpPr>
+          <p:cNvPr id="18" name="Title 17">
+            <a:extLst>
+              <a:ext uri="{FF2B5EF4-FFF2-40B4-BE49-F238E27FC236}">
+                <a16:creationId xmlns:a16="http://schemas.microsoft.com/office/drawing/2014/main" id="{8311A977-A1F3-FAC7-860C-2D9B41E9146A}"/>
+              </a:ext>
+            </a:extLst>
+          </p:cNvPr>
+          <p:cNvSpPr>
+            <a:spLocks noGrp="1"/>
+          </p:cNvSpPr>
+          <p:nvPr>
+            <p:ph type="title"/>
+          </p:nvPr>
+        </p:nvSpPr>
+        <p:spPr/>
+        <p:txBody>
+          <a:bodyPr/>
+          <a:lstStyle/>
+          <a:p>
+            <a:r>
+              <a:rPr lang="en-AU" dirty="0"/>
+              <a:t>load</a:t>
+            </a:r>
+            <a:br>
+              <a:rPr lang="en-AU" dirty="0"/>
+            </a:br>
+            <a:endParaRPr lang="en-AU" dirty="0"/>
+          </a:p>
+        </p:txBody>
+      </p:sp>
+      <p:pic>
+        <p:nvPicPr>
+          <p:cNvPr id="20" name="Picture 19" descr="Diagram&#10;&#10;Description automatically generated">
+            <a:extLst>
+              <a:ext uri="{FF2B5EF4-FFF2-40B4-BE49-F238E27FC236}">
+                <a16:creationId xmlns:a16="http://schemas.microsoft.com/office/drawing/2014/main" id="{06D6312A-2E6B-C626-C3A8-E9667AE6C4B0}"/>
+              </a:ext>
+            </a:extLst>
+          </p:cNvPr>
+          <p:cNvPicPr>
+            <a:picLocks noChangeAspect="1"/>
+          </p:cNvPicPr>
           <p:nvPr/>
-        </p:nvSpPr>
-        <p:spPr>
-          <a:xfrm>
-            <a:off x="10395604" y="3520112"/>
-            <a:ext cx="1796396" cy="302186"/>
+        </p:nvPicPr>
+        <p:blipFill>
+          <a:blip r:embed="rId2"/>
+          <a:stretch>
+            <a:fillRect/>
+          </a:stretch>
+        </p:blipFill>
+        <p:spPr>
+          <a:xfrm>
+            <a:off x="3243532" y="1088136"/>
+            <a:ext cx="6412029" cy="5184296"/>
           </a:xfrm>
           <a:prstGeom prst="rect">
             <a:avLst/>
           </a:prstGeom>
         </p:spPr>
-        <p:txBody>
-          <a:bodyPr vert="horz" lIns="91440" tIns="45720" rIns="91440" bIns="45720" rtlCol="0">
-            <a:noAutofit/>
-          </a:bodyPr>
-          <a:lstStyle>
-            <a:lvl1pPr marL="0" indent="0" algn="l" defTabSz="914400" rtl="0" eaLnBrk="1" latinLnBrk="0" hangingPunct="1">
-              <a:lnSpc>
-                <a:spcPct val="90000"/>
-              </a:lnSpc>
-              <a:spcBef>
-                <a:spcPts val="1000"/>
-              </a:spcBef>
-              <a:buFont typeface="Arial" panose="020B0604020202020204" pitchFamily="34" charset="0"/>
-              <a:buNone/>
-              <a:defRPr sz="2000" b="1" kern="1200">
-                <a:solidFill>
-                  <a:schemeClr val="accent3"/>
-                </a:solidFill>
-                <a:latin typeface="+mj-lt"/>
-                <a:ea typeface="+mn-ea"/>
-                <a:cs typeface="+mn-cs"/>
-              </a:defRPr>
-            </a:lvl1pPr>
-            <a:lvl2pPr marL="457200" indent="0" algn="l" defTabSz="914400" rtl="0" eaLnBrk="1" latinLnBrk="0" hangingPunct="1">
-              <a:lnSpc>
-                <a:spcPct val="90000"/>
-              </a:lnSpc>
-              <a:spcBef>
-                <a:spcPts val="500"/>
-              </a:spcBef>
-              <a:buFont typeface="Arial" panose="020B0604020202020204" pitchFamily="34" charset="0"/>
-              <a:buNone/>
-              <a:defRPr sz="1800" kern="1200">
-                <a:solidFill>
-                  <a:schemeClr val="tx1"/>
-                </a:solidFill>
-                <a:latin typeface="+mn-lt"/>
-                <a:ea typeface="+mn-ea"/>
-                <a:cs typeface="+mn-cs"/>
-              </a:defRPr>
-            </a:lvl2pPr>
-            <a:lvl3pPr marL="914400" indent="0" algn="l" defTabSz="914400" rtl="0" eaLnBrk="1" latinLnBrk="0" hangingPunct="1">
-              <a:lnSpc>
-                <a:spcPct val="90000"/>
-              </a:lnSpc>
-              <a:spcBef>
-                <a:spcPts val="500"/>
-              </a:spcBef>
-              <a:buFont typeface="Arial" panose="020B0604020202020204" pitchFamily="34" charset="0"/>
-              <a:buNone/>
-              <a:defRPr sz="1800" kern="1200">
-                <a:solidFill>
-                  <a:schemeClr val="tx1"/>
-                </a:solidFill>
-                <a:latin typeface="+mn-lt"/>
-                <a:ea typeface="+mn-ea"/>
-                <a:cs typeface="+mn-cs"/>
-              </a:defRPr>
-            </a:lvl3pPr>
-            <a:lvl4pPr marL="1371600" indent="0" algn="l" defTabSz="914400" rtl="0" eaLnBrk="1" latinLnBrk="0" hangingPunct="1">
-              <a:lnSpc>
-                <a:spcPct val="90000"/>
-              </a:lnSpc>
-              <a:spcBef>
-                <a:spcPts val="500"/>
-              </a:spcBef>
-              <a:buFont typeface="Arial" panose="020B0604020202020204" pitchFamily="34" charset="0"/>
-              <a:buNone/>
-              <a:defRPr sz="1800" kern="1200">
-                <a:solidFill>
-                  <a:schemeClr val="tx1"/>
-                </a:solidFill>
-                <a:latin typeface="+mn-lt"/>
-                <a:ea typeface="+mn-ea"/>
-                <a:cs typeface="+mn-cs"/>
-              </a:defRPr>
-            </a:lvl4pPr>
-            <a:lvl5pPr marL="1828800" indent="0" algn="l" defTabSz="914400" rtl="0" eaLnBrk="1" latinLnBrk="0" hangingPunct="1">
-              <a:lnSpc>
-                <a:spcPct val="90000"/>
-              </a:lnSpc>
-              <a:spcBef>
-                <a:spcPts val="500"/>
-              </a:spcBef>
-              <a:buFont typeface="Arial" panose="020B0604020202020204" pitchFamily="34" charset="0"/>
-              <a:buNone/>
-              <a:defRPr sz="1800" kern="1200">
-                <a:solidFill>
-                  <a:schemeClr val="tx1"/>
-                </a:solidFill>
-                <a:latin typeface="+mn-lt"/>
-                <a:ea typeface="+mn-ea"/>
-                <a:cs typeface="+mn-cs"/>
-              </a:defRPr>
-            </a:lvl5pPr>
-            <a:lvl6pPr marL="2514600" indent="-228600" algn="l" defTabSz="914400" rtl="0" eaLnBrk="1" latinLnBrk="0" hangingPunct="1">
-              <a:lnSpc>
-                <a:spcPct val="90000"/>
-              </a:lnSpc>
-              <a:spcBef>
-                <a:spcPts val="500"/>
-              </a:spcBef>
-              <a:buFont typeface="Arial" panose="020B0604020202020204" pitchFamily="34" charset="0"/>
-              <a:buChar char="•"/>
-              <a:defRPr sz="1800" kern="1200">
-                <a:solidFill>
-                  <a:schemeClr val="tx1"/>
-                </a:solidFill>
-                <a:latin typeface="+mn-lt"/>
-                <a:ea typeface="+mn-ea"/>
-                <a:cs typeface="+mn-cs"/>
-              </a:defRPr>
-            </a:lvl6pPr>
-            <a:lvl7pPr marL="2971800" indent="-228600" algn="l" defTabSz="914400" rtl="0" eaLnBrk="1" latinLnBrk="0" hangingPunct="1">
-              <a:lnSpc>
-                <a:spcPct val="90000"/>
-              </a:lnSpc>
-              <a:spcBef>
-                <a:spcPts val="500"/>
-              </a:spcBef>
-              <a:buFont typeface="Arial" panose="020B0604020202020204" pitchFamily="34" charset="0"/>
-              <a:buChar char="•"/>
-              <a:defRPr sz="1800" kern="1200">
-                <a:solidFill>
-                  <a:schemeClr val="tx1"/>
-                </a:solidFill>
-                <a:latin typeface="+mn-lt"/>
-                <a:ea typeface="+mn-ea"/>
-                <a:cs typeface="+mn-cs"/>
-              </a:defRPr>
-            </a:lvl7pPr>
-            <a:lvl8pPr marL="3429000" indent="-228600" algn="l" defTabSz="914400" rtl="0" eaLnBrk="1" latinLnBrk="0" hangingPunct="1">
-              <a:lnSpc>
-                <a:spcPct val="90000"/>
-              </a:lnSpc>
-              <a:spcBef>
-                <a:spcPts val="500"/>
-              </a:spcBef>
-              <a:buFont typeface="Arial" panose="020B0604020202020204" pitchFamily="34" charset="0"/>
-              <a:buChar char="•"/>
-              <a:defRPr sz="1800" kern="1200">
-                <a:solidFill>
-                  <a:schemeClr val="tx1"/>
-                </a:solidFill>
-                <a:latin typeface="+mn-lt"/>
-                <a:ea typeface="+mn-ea"/>
-                <a:cs typeface="+mn-cs"/>
-              </a:defRPr>
-            </a:lvl8pPr>
-            <a:lvl9pPr marL="3886200" indent="-228600" algn="l" defTabSz="914400" rtl="0" eaLnBrk="1" latinLnBrk="0" hangingPunct="1">
-              <a:lnSpc>
-                <a:spcPct val="90000"/>
-              </a:lnSpc>
-              <a:spcBef>
-                <a:spcPts val="500"/>
-              </a:spcBef>
-              <a:buFont typeface="Arial" panose="020B0604020202020204" pitchFamily="34" charset="0"/>
-              <a:buChar char="•"/>
-              <a:defRPr sz="1800" kern="1200">
-                <a:solidFill>
-                  <a:schemeClr val="tx1"/>
-                </a:solidFill>
-                <a:latin typeface="+mn-lt"/>
-                <a:ea typeface="+mn-ea"/>
-                <a:cs typeface="+mn-cs"/>
-              </a:defRPr>
-            </a:lvl9pPr>
-          </a:lstStyle>
-          <a:p>
-            <a:r>
-              <a:rPr lang="en-US" dirty="0"/>
-              <a:t>X.X</a:t>
-            </a:r>
-          </a:p>
-          <a:p>
-            <a:r>
-              <a:rPr lang="en-US" dirty="0"/>
-              <a:t>X.Y</a:t>
-            </a:r>
-          </a:p>
-          <a:p>
-            <a:r>
-              <a:rPr lang="en-US" dirty="0"/>
-              <a:t>X.Z</a:t>
-            </a:r>
-          </a:p>
-        </p:txBody>
-      </p:sp>
+      </p:pic>
+      <p:pic>
+        <p:nvPicPr>
+          <p:cNvPr id="25" name="Picture 24">
+            <a:extLst>
+              <a:ext uri="{FF2B5EF4-FFF2-40B4-BE49-F238E27FC236}">
+                <a16:creationId xmlns:a16="http://schemas.microsoft.com/office/drawing/2014/main" id="{0A6D8618-7847-E207-4337-7547488A7F85}"/>
+              </a:ext>
+            </a:extLst>
+          </p:cNvPr>
+          <p:cNvPicPr>
+            <a:picLocks noChangeAspect="1"/>
+          </p:cNvPicPr>
+          <p:nvPr/>
+        </p:nvPicPr>
+        <p:blipFill>
+          <a:blip r:embed="rId3"/>
+          <a:stretch>
+            <a:fillRect/>
+          </a:stretch>
+        </p:blipFill>
+        <p:spPr>
+          <a:xfrm>
+            <a:off x="230124" y="1088136"/>
+            <a:ext cx="2724530" cy="5134692"/>
+          </a:xfrm>
+          <a:prstGeom prst="rect">
+            <a:avLst/>
+          </a:prstGeom>
+        </p:spPr>
+      </p:pic>
+      <p:pic>
+        <p:nvPicPr>
+          <p:cNvPr id="27" name="Picture 26">
+            <a:extLst>
+              <a:ext uri="{FF2B5EF4-FFF2-40B4-BE49-F238E27FC236}">
+                <a16:creationId xmlns:a16="http://schemas.microsoft.com/office/drawing/2014/main" id="{53E61726-D253-90E4-5548-BE7AAF1A30DF}"/>
+              </a:ext>
+            </a:extLst>
+          </p:cNvPr>
+          <p:cNvPicPr>
+            <a:picLocks noChangeAspect="1"/>
+          </p:cNvPicPr>
+          <p:nvPr/>
+        </p:nvPicPr>
+        <p:blipFill>
+          <a:blip r:embed="rId4"/>
+          <a:stretch>
+            <a:fillRect/>
+          </a:stretch>
+        </p:blipFill>
+        <p:spPr>
+          <a:xfrm>
+            <a:off x="9652670" y="2143664"/>
+            <a:ext cx="2312098" cy="2570671"/>
+          </a:xfrm>
+          <a:prstGeom prst="rect">
+            <a:avLst/>
+          </a:prstGeom>
+        </p:spPr>
+      </p:pic>
     </p:spTree>
     <p:extLst>
       <p:ext uri="{BB962C8B-B14F-4D97-AF65-F5344CB8AC3E}">
-        <p14:creationId xmlns:p14="http://schemas.microsoft.com/office/powerpoint/2010/main" val="4230622197"/>
+        <p14:creationId xmlns:p14="http://schemas.microsoft.com/office/powerpoint/2010/main" val="1962603023"/>
       </p:ext>
     </p:extLst>
   </p:cSld>
@@ -6097,24 +6839,6 @@
 </file>
 
 <file path=customXml/item1.xml><?xml version="1.0" encoding="utf-8"?>
-<p:properties xmlns:p="http://schemas.microsoft.com/office/2006/metadata/properties" xmlns:xsi="http://www.w3.org/2001/XMLSchema-instance" xmlns:pc="http://schemas.microsoft.com/office/infopath/2007/PartnerControls">
-  <documentManagement>
-    <Status xmlns="71af3243-3dd4-4a8d-8c0d-dd76da1f02a5">Not started</Status>
-    <MediaServiceKeyPoints xmlns="71af3243-3dd4-4a8d-8c0d-dd76da1f02a5" xsi:nil="true"/>
-  </documentManagement>
-</p:properties>
-</file>
-
-<file path=customXml/item2.xml><?xml version="1.0" encoding="utf-8"?>
-<?mso-contentType ?>
-<FormTemplates xmlns="http://schemas.microsoft.com/sharepoint/v3/contenttype/forms">
-  <Display>DocumentLibraryForm</Display>
-  <Edit>DocumentLibraryForm</Edit>
-  <New>DocumentLibraryForm</New>
-</FormTemplates>
-</file>
-
-<file path=customXml/item3.xml><?xml version="1.0" encoding="utf-8"?>
 <ct:contentTypeSchema xmlns:ct="http://schemas.microsoft.com/office/2006/metadata/contentType" xmlns:ma="http://schemas.microsoft.com/office/2006/metadata/properties/metaAttributes" ct:_="" ma:_="" ma:contentTypeName="Document" ma:contentTypeID="0x01010079F111ED35F8CC479449609E8A0923A6" ma:contentTypeVersion="12" ma:contentTypeDescription="Create a new document." ma:contentTypeScope="" ma:versionID="426e97fa315356fffbdcd9876fe988c2">
   <xsd:schema xmlns:xsd="http://www.w3.org/2001/XMLSchema" xmlns:xs="http://www.w3.org/2001/XMLSchema" xmlns:p="http://schemas.microsoft.com/office/2006/metadata/properties" xmlns:ns2="71af3243-3dd4-4a8d-8c0d-dd76da1f02a5" xmlns:ns3="16c05727-aa75-4e4a-9b5f-8a80a1165891" targetNamespace="http://schemas.microsoft.com/office/2006/metadata/properties" ma:root="true" ma:fieldsID="14b8f0def80e6d70ce3def20c90759ae" ns2:_="" ns3:_="">
     <xsd:import namespace="71af3243-3dd4-4a8d-8c0d-dd76da1f02a5"/>
@@ -6335,25 +7059,25 @@
 </ct:contentTypeSchema>
 </file>
 
-<file path=customXml/itemProps1.xml><?xml version="1.0" encoding="utf-8"?>
-<ds:datastoreItem xmlns:ds="http://schemas.openxmlformats.org/officeDocument/2006/customXml" ds:itemID="{B211B2B9-8CE5-4E5A-B70F-6B056FE844E8}">
-  <ds:schemaRefs>
-    <ds:schemaRef ds:uri="http://schemas.microsoft.com/office/2006/metadata/properties"/>
-    <ds:schemaRef ds:uri="http://schemas.microsoft.com/office/infopath/2007/PartnerControls"/>
-    <ds:schemaRef ds:uri="71af3243-3dd4-4a8d-8c0d-dd76da1f02a5"/>
-  </ds:schemaRefs>
-</ds:datastoreItem>
+<file path=customXml/item2.xml><?xml version="1.0" encoding="utf-8"?>
+<?mso-contentType ?>
+<FormTemplates xmlns="http://schemas.microsoft.com/sharepoint/v3/contenttype/forms">
+  <Display>DocumentLibraryForm</Display>
+  <Edit>DocumentLibraryForm</Edit>
+  <New>DocumentLibraryForm</New>
+</FormTemplates>
 </file>
 
-<file path=customXml/itemProps2.xml><?xml version="1.0" encoding="utf-8"?>
-<ds:datastoreItem xmlns:ds="http://schemas.openxmlformats.org/officeDocument/2006/customXml" ds:itemID="{466BA265-3C9C-41FF-80C6-61A7F961C0DC}">
-  <ds:schemaRefs>
-    <ds:schemaRef ds:uri="http://schemas.microsoft.com/sharepoint/v3/contenttype/forms"/>
-  </ds:schemaRefs>
-</ds:datastoreItem>
+<file path=customXml/item3.xml><?xml version="1.0" encoding="utf-8"?>
+<p:properties xmlns:p="http://schemas.microsoft.com/office/2006/metadata/properties" xmlns:xsi="http://www.w3.org/2001/XMLSchema-instance" xmlns:pc="http://schemas.microsoft.com/office/infopath/2007/PartnerControls">
+  <documentManagement>
+    <Status xmlns="71af3243-3dd4-4a8d-8c0d-dd76da1f02a5">Not started</Status>
+    <MediaServiceKeyPoints xmlns="71af3243-3dd4-4a8d-8c0d-dd76da1f02a5" xsi:nil="true"/>
+  </documentManagement>
+</p:properties>
 </file>
 
-<file path=customXml/itemProps3.xml><?xml version="1.0" encoding="utf-8"?>
+<file path=customXml/itemProps1.xml><?xml version="1.0" encoding="utf-8"?>
 <ds:datastoreItem xmlns:ds="http://schemas.openxmlformats.org/officeDocument/2006/customXml" ds:itemID="{5055BC56-8FA3-435B-ACDD-0E8E6241EF63}">
   <ds:schemaRefs>
     <ds:schemaRef ds:uri="http://schemas.microsoft.com/office/2006/metadata/contentType"/>
@@ -6370,4 +7094,22 @@
     <ds:schemaRef ds:uri="http://schemas.microsoft.com/internal/obd"/>
   </ds:schemaRefs>
 </ds:datastoreItem>
+</file>
+
+<file path=customXml/itemProps2.xml><?xml version="1.0" encoding="utf-8"?>
+<ds:datastoreItem xmlns:ds="http://schemas.openxmlformats.org/officeDocument/2006/customXml" ds:itemID="{466BA265-3C9C-41FF-80C6-61A7F961C0DC}">
+  <ds:schemaRefs>
+    <ds:schemaRef ds:uri="http://schemas.microsoft.com/sharepoint/v3/contenttype/forms"/>
+  </ds:schemaRefs>
+</ds:datastoreItem>
+</file>
+
+<file path=customXml/itemProps3.xml><?xml version="1.0" encoding="utf-8"?>
+<ds:datastoreItem xmlns:ds="http://schemas.openxmlformats.org/officeDocument/2006/customXml" ds:itemID="{B211B2B9-8CE5-4E5A-B70F-6B056FE844E8}">
+  <ds:schemaRefs>
+    <ds:schemaRef ds:uri="http://schemas.microsoft.com/office/2006/metadata/properties"/>
+    <ds:schemaRef ds:uri="http://schemas.microsoft.com/office/infopath/2007/PartnerControls"/>
+    <ds:schemaRef ds:uri="71af3243-3dd4-4a8d-8c0d-dd76da1f02a5"/>
+  </ds:schemaRefs>
+</ds:datastoreItem>
 </file>
</xml_diff>

<commit_message>
Update Project 2-ETL - ERP vs.AWE.pptx
</commit_message>
<xml_diff>
--- a/Project 2-ETL - ERP vs.AWE.pptx
+++ b/Project 2-ETL - ERP vs.AWE.pptx
@@ -5,11 +5,10 @@
     <p:sldMasterId id="2147483662" r:id="rId4"/>
   </p:sldMasterIdLst>
   <p:sldIdLst>
-    <p:sldId id="284" r:id="rId5"/>
-    <p:sldId id="286" r:id="rId6"/>
+    <p:sldId id="288" r:id="rId5"/>
+    <p:sldId id="284" r:id="rId6"/>
     <p:sldId id="287" r:id="rId7"/>
-    <p:sldId id="288" r:id="rId8"/>
-    <p:sldId id="285" r:id="rId9"/>
+    <p:sldId id="285" r:id="rId8"/>
   </p:sldIdLst>
   <p:sldSz cx="12192000" cy="6858000"/>
   <p:notesSz cx="6858000" cy="9144000"/>
@@ -4086,6 +4085,420 @@
 </file>
 
 <file path=ppt/slides/slide1.xml><?xml version="1.0" encoding="utf-8"?>
+<p:sld xmlns:a="http://schemas.openxmlformats.org/drawingml/2006/main" xmlns:r="http://schemas.openxmlformats.org/officeDocument/2006/relationships" xmlns:p="http://schemas.openxmlformats.org/presentationml/2006/main">
+  <p:cSld>
+    <p:spTree>
+      <p:nvGrpSpPr>
+        <p:cNvPr id="1" name=""/>
+        <p:cNvGrpSpPr/>
+        <p:nvPr/>
+      </p:nvGrpSpPr>
+      <p:grpSpPr>
+        <a:xfrm>
+          <a:off x="0" y="0"/>
+          <a:ext cx="0" cy="0"/>
+          <a:chOff x="0" y="0"/>
+          <a:chExt cx="0" cy="0"/>
+        </a:xfrm>
+      </p:grpSpPr>
+      <p:sp>
+        <p:nvSpPr>
+          <p:cNvPr id="4" name="Text Placeholder 3">
+            <a:extLst>
+              <a:ext uri="{FF2B5EF4-FFF2-40B4-BE49-F238E27FC236}">
+                <a16:creationId xmlns:a16="http://schemas.microsoft.com/office/drawing/2014/main" id="{3A104F06-533B-055D-2D37-8FDDEB20738B}"/>
+              </a:ext>
+            </a:extLst>
+          </p:cNvPr>
+          <p:cNvSpPr>
+            <a:spLocks noGrp="1" noRot="1" noMove="1" noResize="1" noEditPoints="1" noAdjustHandles="1" noChangeArrowheads="1" noChangeShapeType="1"/>
+          </p:cNvSpPr>
+          <p:nvPr>
+            <p:ph type="body" sz="quarter" idx="32"/>
+          </p:nvPr>
+        </p:nvSpPr>
+        <p:spPr>
+          <a:xfrm>
+            <a:off x="4524624" y="3000102"/>
+            <a:ext cx="1208897" cy="302186"/>
+          </a:xfrm>
+        </p:spPr>
+        <p:txBody>
+          <a:bodyPr/>
+          <a:lstStyle/>
+          <a:p>
+            <a:pPr algn="ctr"/>
+            <a:r>
+              <a:rPr lang="en-AU" dirty="0"/>
+              <a:t>Johan Snyman</a:t>
+            </a:r>
+          </a:p>
+        </p:txBody>
+      </p:sp>
+      <p:sp>
+        <p:nvSpPr>
+          <p:cNvPr id="8" name="Text Placeholder 7">
+            <a:extLst>
+              <a:ext uri="{FF2B5EF4-FFF2-40B4-BE49-F238E27FC236}">
+                <a16:creationId xmlns:a16="http://schemas.microsoft.com/office/drawing/2014/main" id="{DCF2149B-661E-8E67-E006-01665429D603}"/>
+              </a:ext>
+            </a:extLst>
+          </p:cNvPr>
+          <p:cNvSpPr>
+            <a:spLocks noGrp="1" noRot="1" noMove="1" noResize="1" noEditPoints="1" noAdjustHandles="1" noChangeArrowheads="1" noChangeShapeType="1"/>
+          </p:cNvSpPr>
+          <p:nvPr>
+            <p:ph type="body" sz="quarter" idx="36"/>
+          </p:nvPr>
+        </p:nvSpPr>
+        <p:spPr>
+          <a:xfrm>
+            <a:off x="9133811" y="3000102"/>
+            <a:ext cx="1181099" cy="302186"/>
+          </a:xfrm>
+        </p:spPr>
+        <p:txBody>
+          <a:bodyPr/>
+          <a:lstStyle/>
+          <a:p>
+            <a:pPr algn="ctr"/>
+            <a:r>
+              <a:rPr lang="en-AU" dirty="0"/>
+              <a:t>Jon Wood</a:t>
+            </a:r>
+          </a:p>
+        </p:txBody>
+      </p:sp>
+      <p:pic>
+        <p:nvPicPr>
+          <p:cNvPr id="20" name="Picture 19">
+            <a:extLst>
+              <a:ext uri="{FF2B5EF4-FFF2-40B4-BE49-F238E27FC236}">
+                <a16:creationId xmlns:a16="http://schemas.microsoft.com/office/drawing/2014/main" id="{611947A0-5876-7204-2B0A-740491933FA1}"/>
+              </a:ext>
+            </a:extLst>
+          </p:cNvPr>
+          <p:cNvPicPr>
+            <a:picLocks noGrp="1" noRot="1" noChangeAspect="1" noMove="1" noResize="1" noEditPoints="1" noAdjustHandles="1" noChangeArrowheads="1" noChangeShapeType="1" noCrop="1"/>
+          </p:cNvPicPr>
+          <p:nvPr/>
+        </p:nvPicPr>
+        <p:blipFill>
+          <a:blip r:embed="rId2"/>
+          <a:stretch>
+            <a:fillRect/>
+          </a:stretch>
+        </p:blipFill>
+        <p:spPr>
+          <a:xfrm>
+            <a:off x="2545106" y="2814633"/>
+            <a:ext cx="1979518" cy="2342625"/>
+          </a:xfrm>
+          <a:prstGeom prst="rect">
+            <a:avLst/>
+          </a:prstGeom>
+        </p:spPr>
+      </p:pic>
+      <p:pic>
+        <p:nvPicPr>
+          <p:cNvPr id="24" name="Picture 23">
+            <a:extLst>
+              <a:ext uri="{FF2B5EF4-FFF2-40B4-BE49-F238E27FC236}">
+                <a16:creationId xmlns:a16="http://schemas.microsoft.com/office/drawing/2014/main" id="{390DE515-569A-185B-7847-D7789074935A}"/>
+              </a:ext>
+            </a:extLst>
+          </p:cNvPr>
+          <p:cNvPicPr>
+            <a:picLocks noGrp="1" noRot="1" noChangeAspect="1" noMove="1" noResize="1" noEditPoints="1" noAdjustHandles="1" noChangeArrowheads="1" noChangeShapeType="1" noCrop="1"/>
+          </p:cNvPicPr>
+          <p:nvPr/>
+        </p:nvPicPr>
+        <p:blipFill>
+          <a:blip r:embed="rId3"/>
+          <a:stretch>
+            <a:fillRect/>
+          </a:stretch>
+        </p:blipFill>
+        <p:spPr>
+          <a:xfrm>
+            <a:off x="7320353" y="2814633"/>
+            <a:ext cx="1979518" cy="2455840"/>
+          </a:xfrm>
+          <a:prstGeom prst="rect">
+            <a:avLst/>
+          </a:prstGeom>
+        </p:spPr>
+      </p:pic>
+      <p:sp>
+        <p:nvSpPr>
+          <p:cNvPr id="18" name="Title 17">
+            <a:extLst>
+              <a:ext uri="{FF2B5EF4-FFF2-40B4-BE49-F238E27FC236}">
+                <a16:creationId xmlns:a16="http://schemas.microsoft.com/office/drawing/2014/main" id="{925CC7DD-BEBC-0660-1A6D-F17BF5ACD037}"/>
+              </a:ext>
+            </a:extLst>
+          </p:cNvPr>
+          <p:cNvSpPr>
+            <a:spLocks noGrp="1"/>
+          </p:cNvSpPr>
+          <p:nvPr>
+            <p:ph type="title"/>
+          </p:nvPr>
+        </p:nvSpPr>
+        <p:spPr>
+          <a:xfrm>
+            <a:off x="230124" y="199542"/>
+            <a:ext cx="11731752" cy="630936"/>
+          </a:xfrm>
+        </p:spPr>
+        <p:txBody>
+          <a:bodyPr/>
+          <a:lstStyle/>
+          <a:p>
+            <a:r>
+              <a:rPr lang="en-AU" sz="4000" dirty="0"/>
+              <a:t>UWA DATA ANALYSIS BOOTCAMP - PROJECT 2 ETL</a:t>
+            </a:r>
+            <a:br>
+              <a:rPr lang="en-AU" sz="4000" dirty="0"/>
+            </a:br>
+            <a:br>
+              <a:rPr lang="en-AU" sz="4000" dirty="0"/>
+            </a:br>
+            <a:r>
+              <a:rPr lang="en-AU" sz="4000" dirty="0"/>
+              <a:t>TEAM 6 proposal</a:t>
+            </a:r>
+          </a:p>
+        </p:txBody>
+      </p:sp>
+      <p:sp>
+        <p:nvSpPr>
+          <p:cNvPr id="25" name="TextBox 24">
+            <a:extLst>
+              <a:ext uri="{FF2B5EF4-FFF2-40B4-BE49-F238E27FC236}">
+                <a16:creationId xmlns:a16="http://schemas.microsoft.com/office/drawing/2014/main" id="{F2C28EB3-2A6F-1A11-D682-F5147D634844}"/>
+              </a:ext>
+            </a:extLst>
+          </p:cNvPr>
+          <p:cNvSpPr txBox="1"/>
+          <p:nvPr/>
+        </p:nvSpPr>
+        <p:spPr>
+          <a:xfrm>
+            <a:off x="3501576" y="5926346"/>
+            <a:ext cx="7923273" cy="523220"/>
+          </a:xfrm>
+          <a:prstGeom prst="rect">
+            <a:avLst/>
+          </a:prstGeom>
+          <a:noFill/>
+        </p:spPr>
+        <p:txBody>
+          <a:bodyPr wrap="square" rtlCol="0">
+            <a:spAutoFit/>
+          </a:bodyPr>
+          <a:lstStyle/>
+          <a:p>
+            <a:r>
+              <a:rPr lang="en-AU" sz="2800" dirty="0">
+                <a:solidFill>
+                  <a:schemeClr val="tx1">
+                    <a:lumMod val="85000"/>
+                    <a:lumOff val="15000"/>
+                  </a:schemeClr>
+                </a:solidFill>
+                <a:latin typeface="Consolas" panose="020B0609020204030204" pitchFamily="49" charset="0"/>
+              </a:rPr>
+              <a:t>https://github.com/jonowood/Project_2</a:t>
+            </a:r>
+          </a:p>
+        </p:txBody>
+      </p:sp>
+      <p:sp>
+        <p:nvSpPr>
+          <p:cNvPr id="26" name="Text Placeholder 1">
+            <a:extLst>
+              <a:ext uri="{FF2B5EF4-FFF2-40B4-BE49-F238E27FC236}">
+                <a16:creationId xmlns:a16="http://schemas.microsoft.com/office/drawing/2014/main" id="{D434B1CD-60A4-7EF1-38E8-C787D890BDB7}"/>
+              </a:ext>
+            </a:extLst>
+          </p:cNvPr>
+          <p:cNvSpPr>
+            <a:spLocks noGrp="1"/>
+          </p:cNvSpPr>
+          <p:nvPr>
+            <p:ph type="body" sz="quarter" idx="10"/>
+          </p:nvPr>
+        </p:nvSpPr>
+        <p:spPr>
+          <a:xfrm>
+            <a:off x="419067" y="5975308"/>
+            <a:ext cx="3035839" cy="302186"/>
+          </a:xfrm>
+        </p:spPr>
+        <p:txBody>
+          <a:bodyPr/>
+          <a:lstStyle/>
+          <a:p>
+            <a:r>
+              <a:rPr lang="en-AU" sz="2400" dirty="0"/>
+              <a:t>Our Git Repository</a:t>
+            </a:r>
+            <a:r>
+              <a:rPr lang="en-AU" sz="2000" dirty="0"/>
+              <a:t>	</a:t>
+            </a:r>
+          </a:p>
+        </p:txBody>
+      </p:sp>
+      <p:sp>
+        <p:nvSpPr>
+          <p:cNvPr id="27" name="Text Placeholder 1">
+            <a:extLst>
+              <a:ext uri="{FF2B5EF4-FFF2-40B4-BE49-F238E27FC236}">
+                <a16:creationId xmlns:a16="http://schemas.microsoft.com/office/drawing/2014/main" id="{86B3A13D-679C-2333-4DA6-656466ED417B}"/>
+              </a:ext>
+            </a:extLst>
+          </p:cNvPr>
+          <p:cNvSpPr txBox="1">
+            <a:spLocks/>
+          </p:cNvSpPr>
+          <p:nvPr/>
+        </p:nvSpPr>
+        <p:spPr>
+          <a:xfrm>
+            <a:off x="419067" y="2369980"/>
+            <a:ext cx="3035839" cy="302186"/>
+          </a:xfrm>
+          <a:prstGeom prst="rect">
+            <a:avLst/>
+          </a:prstGeom>
+        </p:spPr>
+        <p:txBody>
+          <a:bodyPr vert="horz" lIns="0" tIns="45720" rIns="0" bIns="45720" rtlCol="0">
+            <a:noAutofit/>
+          </a:bodyPr>
+          <a:lstStyle>
+            <a:lvl1pPr indent="0">
+              <a:lnSpc>
+                <a:spcPct val="90000"/>
+              </a:lnSpc>
+              <a:spcBef>
+                <a:spcPts val="1000"/>
+              </a:spcBef>
+              <a:buFont typeface="Arial" panose="020B0604020202020204" pitchFamily="34" charset="0"/>
+              <a:buNone/>
+              <a:defRPr sz="1600" b="1">
+                <a:solidFill>
+                  <a:schemeClr val="accent6"/>
+                </a:solidFill>
+                <a:latin typeface="+mj-lt"/>
+              </a:defRPr>
+            </a:lvl1pPr>
+            <a:lvl2pPr indent="0">
+              <a:lnSpc>
+                <a:spcPct val="90000"/>
+              </a:lnSpc>
+              <a:spcBef>
+                <a:spcPts val="500"/>
+              </a:spcBef>
+              <a:buFont typeface="Arial" panose="020B0604020202020204" pitchFamily="34" charset="0"/>
+              <a:buNone/>
+            </a:lvl2pPr>
+            <a:lvl3pPr indent="0">
+              <a:lnSpc>
+                <a:spcPct val="90000"/>
+              </a:lnSpc>
+              <a:spcBef>
+                <a:spcPts val="500"/>
+              </a:spcBef>
+              <a:buFont typeface="Arial" panose="020B0604020202020204" pitchFamily="34" charset="0"/>
+              <a:buNone/>
+            </a:lvl3pPr>
+            <a:lvl4pPr indent="0">
+              <a:lnSpc>
+                <a:spcPct val="90000"/>
+              </a:lnSpc>
+              <a:spcBef>
+                <a:spcPts val="500"/>
+              </a:spcBef>
+              <a:buFont typeface="Arial" panose="020B0604020202020204" pitchFamily="34" charset="0"/>
+              <a:buNone/>
+            </a:lvl4pPr>
+            <a:lvl5pPr indent="0">
+              <a:lnSpc>
+                <a:spcPct val="90000"/>
+              </a:lnSpc>
+              <a:spcBef>
+                <a:spcPts val="500"/>
+              </a:spcBef>
+              <a:buFont typeface="Arial" panose="020B0604020202020204" pitchFamily="34" charset="0"/>
+              <a:buNone/>
+            </a:lvl5pPr>
+            <a:lvl6pPr marL="2514600" indent="-228600">
+              <a:lnSpc>
+                <a:spcPct val="90000"/>
+              </a:lnSpc>
+              <a:spcBef>
+                <a:spcPts val="500"/>
+              </a:spcBef>
+              <a:buFont typeface="Arial" panose="020B0604020202020204" pitchFamily="34" charset="0"/>
+              <a:buChar char="•"/>
+            </a:lvl6pPr>
+            <a:lvl7pPr marL="2971800" indent="-228600">
+              <a:lnSpc>
+                <a:spcPct val="90000"/>
+              </a:lnSpc>
+              <a:spcBef>
+                <a:spcPts val="500"/>
+              </a:spcBef>
+              <a:buFont typeface="Arial" panose="020B0604020202020204" pitchFamily="34" charset="0"/>
+              <a:buChar char="•"/>
+            </a:lvl7pPr>
+            <a:lvl8pPr marL="3429000" indent="-228600">
+              <a:lnSpc>
+                <a:spcPct val="90000"/>
+              </a:lnSpc>
+              <a:spcBef>
+                <a:spcPts val="500"/>
+              </a:spcBef>
+              <a:buFont typeface="Arial" panose="020B0604020202020204" pitchFamily="34" charset="0"/>
+              <a:buChar char="•"/>
+            </a:lvl8pPr>
+            <a:lvl9pPr marL="3886200" indent="-228600">
+              <a:lnSpc>
+                <a:spcPct val="90000"/>
+              </a:lnSpc>
+              <a:spcBef>
+                <a:spcPts val="500"/>
+              </a:spcBef>
+              <a:buFont typeface="Arial" panose="020B0604020202020204" pitchFamily="34" charset="0"/>
+              <a:buChar char="•"/>
+            </a:lvl9pPr>
+          </a:lstStyle>
+          <a:p>
+            <a:r>
+              <a:rPr lang="en-AU" sz="2400" dirty="0"/>
+              <a:t>Our Team	</a:t>
+            </a:r>
+          </a:p>
+        </p:txBody>
+      </p:sp>
+    </p:spTree>
+    <p:extLst>
+      <p:ext uri="{BB962C8B-B14F-4D97-AF65-F5344CB8AC3E}">
+        <p14:creationId xmlns:p14="http://schemas.microsoft.com/office/powerpoint/2010/main" val="1276076745"/>
+      </p:ext>
+    </p:extLst>
+  </p:cSld>
+  <p:clrMapOvr>
+    <a:masterClrMapping/>
+  </p:clrMapOvr>
+</p:sld>
+</file>
+
+<file path=ppt/slides/slide2.xml><?xml version="1.0" encoding="utf-8"?>
 <p:sld xmlns:a="http://schemas.openxmlformats.org/drawingml/2006/main" xmlns:r="http://schemas.openxmlformats.org/officeDocument/2006/relationships" xmlns:p="http://schemas.openxmlformats.org/presentationml/2006/main">
   <p:cSld>
     <p:spTree>
@@ -5453,131 +5866,6 @@
 </p:sld>
 </file>
 
-<file path=ppt/slides/slide2.xml><?xml version="1.0" encoding="utf-8"?>
-<p:sld xmlns:a="http://schemas.openxmlformats.org/drawingml/2006/main" xmlns:r="http://schemas.openxmlformats.org/officeDocument/2006/relationships" xmlns:p="http://schemas.openxmlformats.org/presentationml/2006/main">
-  <p:cSld>
-    <p:spTree>
-      <p:nvGrpSpPr>
-        <p:cNvPr id="1" name=""/>
-        <p:cNvGrpSpPr/>
-        <p:nvPr/>
-      </p:nvGrpSpPr>
-      <p:grpSpPr>
-        <a:xfrm>
-          <a:off x="0" y="0"/>
-          <a:ext cx="0" cy="0"/>
-          <a:chOff x="0" y="0"/>
-          <a:chExt cx="0" cy="0"/>
-        </a:xfrm>
-      </p:grpSpPr>
-      <p:sp>
-        <p:nvSpPr>
-          <p:cNvPr id="4" name="Text Placeholder 3">
-            <a:extLst>
-              <a:ext uri="{FF2B5EF4-FFF2-40B4-BE49-F238E27FC236}">
-                <a16:creationId xmlns:a16="http://schemas.microsoft.com/office/drawing/2014/main" id="{D315EB61-2206-9E8D-A734-C38BFA2E2FD1}"/>
-              </a:ext>
-            </a:extLst>
-          </p:cNvPr>
-          <p:cNvSpPr>
-            <a:spLocks noGrp="1"/>
-          </p:cNvSpPr>
-          <p:nvPr>
-            <p:ph type="body" sz="quarter" idx="32"/>
-          </p:nvPr>
-        </p:nvSpPr>
-        <p:spPr>
-          <a:xfrm>
-            <a:off x="230124" y="1088136"/>
-            <a:ext cx="1208897" cy="302186"/>
-          </a:xfrm>
-        </p:spPr>
-        <p:txBody>
-          <a:bodyPr/>
-          <a:lstStyle/>
-          <a:p>
-            <a:endParaRPr lang="en-AU"/>
-          </a:p>
-        </p:txBody>
-      </p:sp>
-      <p:sp>
-        <p:nvSpPr>
-          <p:cNvPr id="5" name="Text Placeholder 4">
-            <a:extLst>
-              <a:ext uri="{FF2B5EF4-FFF2-40B4-BE49-F238E27FC236}">
-                <a16:creationId xmlns:a16="http://schemas.microsoft.com/office/drawing/2014/main" id="{BFA6068F-D1D0-4E74-27A2-E29EEFF1F82B}"/>
-              </a:ext>
-            </a:extLst>
-          </p:cNvPr>
-          <p:cNvSpPr>
-            <a:spLocks noGrp="1"/>
-          </p:cNvSpPr>
-          <p:nvPr>
-            <p:ph type="body" sz="quarter" idx="33"/>
-          </p:nvPr>
-        </p:nvSpPr>
-        <p:spPr>
-          <a:xfrm>
-            <a:off x="230124" y="1559792"/>
-            <a:ext cx="11731752" cy="4979031"/>
-          </a:xfrm>
-        </p:spPr>
-        <p:txBody>
-          <a:bodyPr/>
-          <a:lstStyle/>
-          <a:p>
-            <a:r>
-              <a:rPr lang="en-AU" dirty="0"/>
-              <a:t>Datasets Sourced From - https://explore.data.abs.gov.au/</a:t>
-            </a:r>
-          </a:p>
-        </p:txBody>
-      </p:sp>
-      <p:sp>
-        <p:nvSpPr>
-          <p:cNvPr id="18" name="Title 17">
-            <a:extLst>
-              <a:ext uri="{FF2B5EF4-FFF2-40B4-BE49-F238E27FC236}">
-                <a16:creationId xmlns:a16="http://schemas.microsoft.com/office/drawing/2014/main" id="{DF78A5DC-D443-B9C8-9D1A-E011F27D286B}"/>
-              </a:ext>
-            </a:extLst>
-          </p:cNvPr>
-          <p:cNvSpPr>
-            <a:spLocks noGrp="1"/>
-          </p:cNvSpPr>
-          <p:nvPr>
-            <p:ph type="title"/>
-          </p:nvPr>
-        </p:nvSpPr>
-        <p:spPr/>
-        <p:txBody>
-          <a:bodyPr/>
-          <a:lstStyle/>
-          <a:p>
-            <a:r>
-              <a:rPr lang="en-AU" dirty="0">
-                <a:solidFill>
-                  <a:srgbClr val="4C5DBA"/>
-                </a:solidFill>
-              </a:rPr>
-              <a:t>extract</a:t>
-            </a:r>
-          </a:p>
-        </p:txBody>
-      </p:sp>
-    </p:spTree>
-    <p:extLst>
-      <p:ext uri="{BB962C8B-B14F-4D97-AF65-F5344CB8AC3E}">
-        <p14:creationId xmlns:p14="http://schemas.microsoft.com/office/powerpoint/2010/main" val="2669216245"/>
-      </p:ext>
-    </p:extLst>
-  </p:cSld>
-  <p:clrMapOvr>
-    <a:masterClrMapping/>
-  </p:clrMapOvr>
-</p:sld>
-</file>
-
 <file path=ppt/slides/slide3.xml><?xml version="1.0" encoding="utf-8"?>
 <p:sld xmlns:a="http://schemas.openxmlformats.org/drawingml/2006/main" xmlns:r="http://schemas.openxmlformats.org/officeDocument/2006/relationships" xmlns:p="http://schemas.openxmlformats.org/presentationml/2006/main">
   <p:cSld>
@@ -5613,8 +5901,8 @@
         </p:nvSpPr>
         <p:spPr>
           <a:xfrm>
-            <a:off x="571021" y="1088136"/>
-            <a:ext cx="11138529" cy="471656"/>
+            <a:off x="230125" y="3727814"/>
+            <a:ext cx="11479426" cy="471656"/>
           </a:xfrm>
         </p:spPr>
         <p:txBody>
@@ -5646,7 +5934,7 @@
         </p:nvSpPr>
         <p:spPr>
           <a:xfrm>
-            <a:off x="571021" y="1559791"/>
+            <a:off x="230124" y="4196593"/>
             <a:ext cx="5524980" cy="1597477"/>
           </a:xfrm>
         </p:spPr>
@@ -5660,7 +5948,7 @@
             </a:r>
             <a:r>
               <a:rPr lang="en-US" b="1" dirty="0"/>
-              <a:t>ABS – AWE.CSV 27K datapoints</a:t>
+              <a:t>ABS – AWE.CSV (27K datapoints)</a:t>
             </a:r>
             <a:endParaRPr lang="en-AU" b="1" dirty="0"/>
           </a:p>
@@ -5731,7 +6019,12 @@
             <p:ph type="title"/>
           </p:nvPr>
         </p:nvSpPr>
-        <p:spPr/>
+        <p:spPr>
+          <a:xfrm>
+            <a:off x="230124" y="3010614"/>
+            <a:ext cx="11731752" cy="630936"/>
+          </a:xfrm>
+        </p:spPr>
         <p:txBody>
           <a:bodyPr/>
           <a:lstStyle/>
@@ -5763,7 +6056,7 @@
         </p:nvSpPr>
         <p:spPr>
           <a:xfrm>
-            <a:off x="6095999" y="1556915"/>
+            <a:off x="6095999" y="4196593"/>
             <a:ext cx="5696309" cy="1597477"/>
           </a:xfrm>
           <a:prstGeom prst="rect">
@@ -5945,7 +6238,7 @@
             </a:r>
             <a:r>
               <a:rPr lang="en-US" b="1" dirty="0"/>
-              <a:t>ABS – ERP.CSV 7,5K datapoints</a:t>
+              <a:t>ABS – ERP.CSV 7,5K (datapoints)</a:t>
             </a:r>
             <a:endParaRPr lang="en-AU" b="1" dirty="0"/>
           </a:p>
@@ -5966,27 +6259,515 @@
             </a:pPr>
             <a:r>
               <a:rPr lang="en-US" dirty="0"/>
-              <a:t>Filter column G to only include ‘Original’</a:t>
-            </a:r>
-          </a:p>
-          <a:p>
-            <a:pPr marL="171450" indent="-171450">
+              <a:t>Copy columns to </a:t>
+            </a:r>
+            <a:r>
+              <a:rPr lang="en-US" dirty="0" err="1"/>
+              <a:t>DataFrame</a:t>
+            </a:r>
+            <a:r>
+              <a:rPr lang="en-US" dirty="0"/>
+              <a:t> - REGION: Region, TIME_PERIOD: Time Period, OBS_VALUE</a:t>
+            </a:r>
+            <a:endParaRPr lang="en-AU" dirty="0"/>
+          </a:p>
+        </p:txBody>
+      </p:sp>
+      <p:sp>
+        <p:nvSpPr>
+          <p:cNvPr id="2" name="Text Placeholder 3">
+            <a:extLst>
+              <a:ext uri="{FF2B5EF4-FFF2-40B4-BE49-F238E27FC236}">
+                <a16:creationId xmlns:a16="http://schemas.microsoft.com/office/drawing/2014/main" id="{DC4A6F6B-3C87-C6A6-6022-996363A3989F}"/>
+              </a:ext>
+            </a:extLst>
+          </p:cNvPr>
+          <p:cNvSpPr txBox="1">
+            <a:spLocks/>
+          </p:cNvSpPr>
+          <p:nvPr/>
+        </p:nvSpPr>
+        <p:spPr>
+          <a:xfrm>
+            <a:off x="230124" y="1088136"/>
+            <a:ext cx="1208897" cy="302186"/>
+          </a:xfrm>
+          <a:prstGeom prst="rect">
+            <a:avLst/>
+          </a:prstGeom>
+        </p:spPr>
+        <p:txBody>
+          <a:bodyPr vert="horz" lIns="0" tIns="45720" rIns="0" bIns="45720" rtlCol="0">
+            <a:noAutofit/>
+          </a:bodyPr>
+          <a:lstStyle>
+            <a:lvl1pPr marL="0" indent="0" algn="l" defTabSz="914400" rtl="0" eaLnBrk="1" latinLnBrk="0" hangingPunct="1">
+              <a:lnSpc>
+                <a:spcPct val="90000"/>
+              </a:lnSpc>
+              <a:spcBef>
+                <a:spcPts val="1000"/>
+              </a:spcBef>
+              <a:buFont typeface="Arial" panose="020B0604020202020204" pitchFamily="34" charset="0"/>
+              <a:buNone/>
+              <a:defRPr sz="1600" b="1" kern="1200">
+                <a:solidFill>
+                  <a:schemeClr val="accent5"/>
+                </a:solidFill>
+                <a:latin typeface="+mj-lt"/>
+                <a:ea typeface="+mn-ea"/>
+                <a:cs typeface="+mn-cs"/>
+              </a:defRPr>
+            </a:lvl1pPr>
+            <a:lvl2pPr marL="457200" indent="0" algn="l" defTabSz="914400" rtl="0" eaLnBrk="1" latinLnBrk="0" hangingPunct="1">
+              <a:lnSpc>
+                <a:spcPct val="90000"/>
+              </a:lnSpc>
+              <a:spcBef>
+                <a:spcPts val="500"/>
+              </a:spcBef>
+              <a:buFont typeface="Arial" panose="020B0604020202020204" pitchFamily="34" charset="0"/>
+              <a:buNone/>
+              <a:defRPr sz="1800" kern="1200">
+                <a:solidFill>
+                  <a:schemeClr val="tx1"/>
+                </a:solidFill>
+                <a:latin typeface="+mn-lt"/>
+                <a:ea typeface="+mn-ea"/>
+                <a:cs typeface="+mn-cs"/>
+              </a:defRPr>
+            </a:lvl2pPr>
+            <a:lvl3pPr marL="914400" indent="0" algn="l" defTabSz="914400" rtl="0" eaLnBrk="1" latinLnBrk="0" hangingPunct="1">
+              <a:lnSpc>
+                <a:spcPct val="90000"/>
+              </a:lnSpc>
+              <a:spcBef>
+                <a:spcPts val="500"/>
+              </a:spcBef>
+              <a:buFont typeface="Arial" panose="020B0604020202020204" pitchFamily="34" charset="0"/>
+              <a:buNone/>
+              <a:defRPr sz="1800" kern="1200">
+                <a:solidFill>
+                  <a:schemeClr val="tx1"/>
+                </a:solidFill>
+                <a:latin typeface="+mn-lt"/>
+                <a:ea typeface="+mn-ea"/>
+                <a:cs typeface="+mn-cs"/>
+              </a:defRPr>
+            </a:lvl3pPr>
+            <a:lvl4pPr marL="1371600" indent="0" algn="l" defTabSz="914400" rtl="0" eaLnBrk="1" latinLnBrk="0" hangingPunct="1">
+              <a:lnSpc>
+                <a:spcPct val="90000"/>
+              </a:lnSpc>
+              <a:spcBef>
+                <a:spcPts val="500"/>
+              </a:spcBef>
+              <a:buFont typeface="Arial" panose="020B0604020202020204" pitchFamily="34" charset="0"/>
+              <a:buNone/>
+              <a:defRPr sz="1800" kern="1200">
+                <a:solidFill>
+                  <a:schemeClr val="tx1"/>
+                </a:solidFill>
+                <a:latin typeface="+mn-lt"/>
+                <a:ea typeface="+mn-ea"/>
+                <a:cs typeface="+mn-cs"/>
+              </a:defRPr>
+            </a:lvl4pPr>
+            <a:lvl5pPr marL="1828800" indent="0" algn="l" defTabSz="914400" rtl="0" eaLnBrk="1" latinLnBrk="0" hangingPunct="1">
+              <a:lnSpc>
+                <a:spcPct val="90000"/>
+              </a:lnSpc>
+              <a:spcBef>
+                <a:spcPts val="500"/>
+              </a:spcBef>
+              <a:buFont typeface="Arial" panose="020B0604020202020204" pitchFamily="34" charset="0"/>
+              <a:buNone/>
+              <a:defRPr sz="1800" kern="1200">
+                <a:solidFill>
+                  <a:schemeClr val="tx1"/>
+                </a:solidFill>
+                <a:latin typeface="+mn-lt"/>
+                <a:ea typeface="+mn-ea"/>
+                <a:cs typeface="+mn-cs"/>
+              </a:defRPr>
+            </a:lvl5pPr>
+            <a:lvl6pPr marL="2514600" indent="-228600" algn="l" defTabSz="914400" rtl="0" eaLnBrk="1" latinLnBrk="0" hangingPunct="1">
+              <a:lnSpc>
+                <a:spcPct val="90000"/>
+              </a:lnSpc>
+              <a:spcBef>
+                <a:spcPts val="500"/>
+              </a:spcBef>
               <a:buFont typeface="Arial" panose="020B0604020202020204" pitchFamily="34" charset="0"/>
               <a:buChar char="•"/>
-            </a:pPr>
-            <a:r>
-              <a:rPr lang="en-US" dirty="0"/>
-              <a:t>Copy columns to </a:t>
-            </a:r>
-            <a:r>
-              <a:rPr lang="en-US" dirty="0" err="1"/>
-              <a:t>DataFrame</a:t>
-            </a:r>
-            <a:r>
-              <a:rPr lang="en-US" dirty="0"/>
-              <a:t> - REGION: Region, TIME_PERIOD: Time Period, OBS_VALUE</a:t>
+              <a:defRPr sz="1800" kern="1200">
+                <a:solidFill>
+                  <a:schemeClr val="tx1"/>
+                </a:solidFill>
+                <a:latin typeface="+mn-lt"/>
+                <a:ea typeface="+mn-ea"/>
+                <a:cs typeface="+mn-cs"/>
+              </a:defRPr>
+            </a:lvl6pPr>
+            <a:lvl7pPr marL="2971800" indent="-228600" algn="l" defTabSz="914400" rtl="0" eaLnBrk="1" latinLnBrk="0" hangingPunct="1">
+              <a:lnSpc>
+                <a:spcPct val="90000"/>
+              </a:lnSpc>
+              <a:spcBef>
+                <a:spcPts val="500"/>
+              </a:spcBef>
+              <a:buFont typeface="Arial" panose="020B0604020202020204" pitchFamily="34" charset="0"/>
+              <a:buChar char="•"/>
+              <a:defRPr sz="1800" kern="1200">
+                <a:solidFill>
+                  <a:schemeClr val="tx1"/>
+                </a:solidFill>
+                <a:latin typeface="+mn-lt"/>
+                <a:ea typeface="+mn-ea"/>
+                <a:cs typeface="+mn-cs"/>
+              </a:defRPr>
+            </a:lvl7pPr>
+            <a:lvl8pPr marL="3429000" indent="-228600" algn="l" defTabSz="914400" rtl="0" eaLnBrk="1" latinLnBrk="0" hangingPunct="1">
+              <a:lnSpc>
+                <a:spcPct val="90000"/>
+              </a:lnSpc>
+              <a:spcBef>
+                <a:spcPts val="500"/>
+              </a:spcBef>
+              <a:buFont typeface="Arial" panose="020B0604020202020204" pitchFamily="34" charset="0"/>
+              <a:buChar char="•"/>
+              <a:defRPr sz="1800" kern="1200">
+                <a:solidFill>
+                  <a:schemeClr val="tx1"/>
+                </a:solidFill>
+                <a:latin typeface="+mn-lt"/>
+                <a:ea typeface="+mn-ea"/>
+                <a:cs typeface="+mn-cs"/>
+              </a:defRPr>
+            </a:lvl8pPr>
+            <a:lvl9pPr marL="3886200" indent="-228600" algn="l" defTabSz="914400" rtl="0" eaLnBrk="1" latinLnBrk="0" hangingPunct="1">
+              <a:lnSpc>
+                <a:spcPct val="90000"/>
+              </a:lnSpc>
+              <a:spcBef>
+                <a:spcPts val="500"/>
+              </a:spcBef>
+              <a:buFont typeface="Arial" panose="020B0604020202020204" pitchFamily="34" charset="0"/>
+              <a:buChar char="•"/>
+              <a:defRPr sz="1800" kern="1200">
+                <a:solidFill>
+                  <a:schemeClr val="tx1"/>
+                </a:solidFill>
+                <a:latin typeface="+mn-lt"/>
+                <a:ea typeface="+mn-ea"/>
+                <a:cs typeface="+mn-cs"/>
+              </a:defRPr>
+            </a:lvl9pPr>
+          </a:lstStyle>
+          <a:p>
+            <a:r>
+              <a:rPr lang="en-AU" dirty="0"/>
+              <a:t>Data Sets</a:t>
+            </a:r>
+          </a:p>
+        </p:txBody>
+      </p:sp>
+      <p:sp>
+        <p:nvSpPr>
+          <p:cNvPr id="3" name="Text Placeholder 4">
+            <a:extLst>
+              <a:ext uri="{FF2B5EF4-FFF2-40B4-BE49-F238E27FC236}">
+                <a16:creationId xmlns:a16="http://schemas.microsoft.com/office/drawing/2014/main" id="{3CFF666C-B074-8BD1-9066-962732F90528}"/>
+              </a:ext>
+            </a:extLst>
+          </p:cNvPr>
+          <p:cNvSpPr txBox="1">
+            <a:spLocks/>
+          </p:cNvSpPr>
+          <p:nvPr/>
+        </p:nvSpPr>
+        <p:spPr>
+          <a:xfrm>
+            <a:off x="230124" y="1559792"/>
+            <a:ext cx="11731752" cy="1295551"/>
+          </a:xfrm>
+          <a:prstGeom prst="rect">
+            <a:avLst/>
+          </a:prstGeom>
+        </p:spPr>
+        <p:txBody>
+          <a:bodyPr vert="horz" lIns="0" tIns="45720" rIns="0" bIns="45720" rtlCol="0">
+            <a:noAutofit/>
+          </a:bodyPr>
+          <a:lstStyle>
+            <a:lvl1pPr marL="0" indent="0" algn="l" defTabSz="914400" rtl="0" eaLnBrk="1" latinLnBrk="0" hangingPunct="1">
+              <a:lnSpc>
+                <a:spcPct val="100000"/>
+              </a:lnSpc>
+              <a:spcBef>
+                <a:spcPts val="1000"/>
+              </a:spcBef>
+              <a:buFont typeface="Arial" panose="020B0604020202020204" pitchFamily="34" charset="0"/>
+              <a:buNone/>
+              <a:defRPr sz="1100" kern="1200">
+                <a:solidFill>
+                  <a:schemeClr val="tx1"/>
+                </a:solidFill>
+                <a:latin typeface="+mn-lt"/>
+                <a:ea typeface="+mn-ea"/>
+                <a:cs typeface="+mn-cs"/>
+              </a:defRPr>
+            </a:lvl1pPr>
+            <a:lvl2pPr marL="457200" indent="0" algn="l" defTabSz="914400" rtl="0" eaLnBrk="1" latinLnBrk="0" hangingPunct="1">
+              <a:lnSpc>
+                <a:spcPct val="90000"/>
+              </a:lnSpc>
+              <a:spcBef>
+                <a:spcPts val="500"/>
+              </a:spcBef>
+              <a:buFont typeface="Arial" panose="020B0604020202020204" pitchFamily="34" charset="0"/>
+              <a:buNone/>
+              <a:defRPr sz="1100" kern="1200">
+                <a:solidFill>
+                  <a:schemeClr val="tx1"/>
+                </a:solidFill>
+                <a:latin typeface="+mn-lt"/>
+                <a:ea typeface="+mn-ea"/>
+                <a:cs typeface="+mn-cs"/>
+              </a:defRPr>
+            </a:lvl2pPr>
+            <a:lvl3pPr marL="914400" indent="0" algn="l" defTabSz="914400" rtl="0" eaLnBrk="1" latinLnBrk="0" hangingPunct="1">
+              <a:lnSpc>
+                <a:spcPct val="90000"/>
+              </a:lnSpc>
+              <a:spcBef>
+                <a:spcPts val="500"/>
+              </a:spcBef>
+              <a:buFont typeface="Arial" panose="020B0604020202020204" pitchFamily="34" charset="0"/>
+              <a:buNone/>
+              <a:defRPr sz="1100" kern="1200">
+                <a:solidFill>
+                  <a:schemeClr val="tx1"/>
+                </a:solidFill>
+                <a:latin typeface="+mn-lt"/>
+                <a:ea typeface="+mn-ea"/>
+                <a:cs typeface="+mn-cs"/>
+              </a:defRPr>
+            </a:lvl3pPr>
+            <a:lvl4pPr marL="1371600" indent="0" algn="l" defTabSz="914400" rtl="0" eaLnBrk="1" latinLnBrk="0" hangingPunct="1">
+              <a:lnSpc>
+                <a:spcPct val="90000"/>
+              </a:lnSpc>
+              <a:spcBef>
+                <a:spcPts val="500"/>
+              </a:spcBef>
+              <a:buFont typeface="Arial" panose="020B0604020202020204" pitchFamily="34" charset="0"/>
+              <a:buNone/>
+              <a:defRPr sz="1100" kern="1200">
+                <a:solidFill>
+                  <a:schemeClr val="tx1"/>
+                </a:solidFill>
+                <a:latin typeface="+mn-lt"/>
+                <a:ea typeface="+mn-ea"/>
+                <a:cs typeface="+mn-cs"/>
+              </a:defRPr>
+            </a:lvl4pPr>
+            <a:lvl5pPr marL="1828800" indent="0" algn="l" defTabSz="914400" rtl="0" eaLnBrk="1" latinLnBrk="0" hangingPunct="1">
+              <a:lnSpc>
+                <a:spcPct val="90000"/>
+              </a:lnSpc>
+              <a:spcBef>
+                <a:spcPts val="500"/>
+              </a:spcBef>
+              <a:buFont typeface="Arial" panose="020B0604020202020204" pitchFamily="34" charset="0"/>
+              <a:buNone/>
+              <a:defRPr sz="1100" kern="1200">
+                <a:solidFill>
+                  <a:schemeClr val="tx1"/>
+                </a:solidFill>
+                <a:latin typeface="+mn-lt"/>
+                <a:ea typeface="+mn-ea"/>
+                <a:cs typeface="+mn-cs"/>
+              </a:defRPr>
+            </a:lvl5pPr>
+            <a:lvl6pPr marL="2514600" indent="-228600" algn="l" defTabSz="914400" rtl="0" eaLnBrk="1" latinLnBrk="0" hangingPunct="1">
+              <a:lnSpc>
+                <a:spcPct val="90000"/>
+              </a:lnSpc>
+              <a:spcBef>
+                <a:spcPts val="500"/>
+              </a:spcBef>
+              <a:buFont typeface="Arial" panose="020B0604020202020204" pitchFamily="34" charset="0"/>
+              <a:buChar char="•"/>
+              <a:defRPr sz="1800" kern="1200">
+                <a:solidFill>
+                  <a:schemeClr val="tx1"/>
+                </a:solidFill>
+                <a:latin typeface="+mn-lt"/>
+                <a:ea typeface="+mn-ea"/>
+                <a:cs typeface="+mn-cs"/>
+              </a:defRPr>
+            </a:lvl6pPr>
+            <a:lvl7pPr marL="2971800" indent="-228600" algn="l" defTabSz="914400" rtl="0" eaLnBrk="1" latinLnBrk="0" hangingPunct="1">
+              <a:lnSpc>
+                <a:spcPct val="90000"/>
+              </a:lnSpc>
+              <a:spcBef>
+                <a:spcPts val="500"/>
+              </a:spcBef>
+              <a:buFont typeface="Arial" panose="020B0604020202020204" pitchFamily="34" charset="0"/>
+              <a:buChar char="•"/>
+              <a:defRPr sz="1800" kern="1200">
+                <a:solidFill>
+                  <a:schemeClr val="tx1"/>
+                </a:solidFill>
+                <a:latin typeface="+mn-lt"/>
+                <a:ea typeface="+mn-ea"/>
+                <a:cs typeface="+mn-cs"/>
+              </a:defRPr>
+            </a:lvl7pPr>
+            <a:lvl8pPr marL="3429000" indent="-228600" algn="l" defTabSz="914400" rtl="0" eaLnBrk="1" latinLnBrk="0" hangingPunct="1">
+              <a:lnSpc>
+                <a:spcPct val="90000"/>
+              </a:lnSpc>
+              <a:spcBef>
+                <a:spcPts val="500"/>
+              </a:spcBef>
+              <a:buFont typeface="Arial" panose="020B0604020202020204" pitchFamily="34" charset="0"/>
+              <a:buChar char="•"/>
+              <a:defRPr sz="1800" kern="1200">
+                <a:solidFill>
+                  <a:schemeClr val="tx1"/>
+                </a:solidFill>
+                <a:latin typeface="+mn-lt"/>
+                <a:ea typeface="+mn-ea"/>
+                <a:cs typeface="+mn-cs"/>
+              </a:defRPr>
+            </a:lvl8pPr>
+            <a:lvl9pPr marL="3886200" indent="-228600" algn="l" defTabSz="914400" rtl="0" eaLnBrk="1" latinLnBrk="0" hangingPunct="1">
+              <a:lnSpc>
+                <a:spcPct val="90000"/>
+              </a:lnSpc>
+              <a:spcBef>
+                <a:spcPts val="500"/>
+              </a:spcBef>
+              <a:buFont typeface="Arial" panose="020B0604020202020204" pitchFamily="34" charset="0"/>
+              <a:buChar char="•"/>
+              <a:defRPr sz="1800" kern="1200">
+                <a:solidFill>
+                  <a:schemeClr val="tx1"/>
+                </a:solidFill>
+                <a:latin typeface="+mn-lt"/>
+                <a:ea typeface="+mn-ea"/>
+                <a:cs typeface="+mn-cs"/>
+              </a:defRPr>
+            </a:lvl9pPr>
+          </a:lstStyle>
+          <a:p>
+            <a:r>
+              <a:rPr lang="en-AU" dirty="0"/>
+              <a:t>Datasets Sourced From - </a:t>
+            </a:r>
+            <a:r>
+              <a:rPr lang="en-AU" dirty="0">
+                <a:hlinkClick r:id="rId2"/>
+              </a:rPr>
+              <a:t>https://explore.data.abs.gov.au/</a:t>
             </a:r>
             <a:endParaRPr lang="en-AU" dirty="0"/>
+          </a:p>
+          <a:p>
+            <a:endParaRPr lang="en-AU" dirty="0"/>
+          </a:p>
+          <a:p>
+            <a:r>
+              <a:rPr lang="en-AU" dirty="0"/>
+              <a:t>File A - </a:t>
+            </a:r>
+            <a:r>
+              <a:rPr lang="en-US" b="1" dirty="0"/>
+              <a:t>ABS – AWE.CSV (27K datapoints) -  Population Movement Data for Australia</a:t>
+            </a:r>
+          </a:p>
+          <a:p>
+            <a:r>
+              <a:rPr lang="en-AU" dirty="0"/>
+              <a:t>File B - </a:t>
+            </a:r>
+            <a:r>
+              <a:rPr lang="en-US" b="1" dirty="0"/>
+              <a:t>ABS – ERP.CSV 7,5K (datapoints) – Average  Income Data for Australia</a:t>
+            </a:r>
+            <a:endParaRPr lang="en-AU" b="1" dirty="0"/>
+          </a:p>
+          <a:p>
+            <a:endParaRPr lang="en-AU" b="1" dirty="0"/>
+          </a:p>
+          <a:p>
+            <a:endParaRPr lang="en-AU" dirty="0"/>
+          </a:p>
+        </p:txBody>
+      </p:sp>
+      <p:sp>
+        <p:nvSpPr>
+          <p:cNvPr id="6" name="Title 17">
+            <a:extLst>
+              <a:ext uri="{FF2B5EF4-FFF2-40B4-BE49-F238E27FC236}">
+                <a16:creationId xmlns:a16="http://schemas.microsoft.com/office/drawing/2014/main" id="{4B95AF5B-66B2-408B-0DFE-3787F4801F62}"/>
+              </a:ext>
+            </a:extLst>
+          </p:cNvPr>
+          <p:cNvSpPr txBox="1">
+            <a:spLocks/>
+          </p:cNvSpPr>
+          <p:nvPr/>
+        </p:nvSpPr>
+        <p:spPr>
+          <a:xfrm>
+            <a:off x="230124" y="457200"/>
+            <a:ext cx="11731752" cy="630936"/>
+          </a:xfrm>
+          <a:prstGeom prst="rect">
+            <a:avLst/>
+          </a:prstGeom>
+        </p:spPr>
+        <p:txBody>
+          <a:bodyPr vert="horz" lIns="91440" tIns="45720" rIns="91440" bIns="45720" rtlCol="0" anchor="t" anchorCtr="0">
+            <a:noAutofit/>
+          </a:bodyPr>
+          <a:lstStyle>
+            <a:lvl1pPr algn="ctr" defTabSz="914400" rtl="0" eaLnBrk="1" latinLnBrk="0" hangingPunct="1">
+              <a:lnSpc>
+                <a:spcPct val="90000"/>
+              </a:lnSpc>
+              <a:spcBef>
+                <a:spcPts val="1000"/>
+              </a:spcBef>
+              <a:buNone/>
+              <a:defRPr sz="3600" b="1" kern="1200" cap="all" baseline="0">
+                <a:solidFill>
+                  <a:schemeClr val="tx1"/>
+                </a:solidFill>
+                <a:latin typeface="+mj-lt"/>
+                <a:ea typeface="+mj-ea"/>
+                <a:cs typeface="+mj-cs"/>
+              </a:defRPr>
+            </a:lvl1pPr>
+          </a:lstStyle>
+          <a:p>
+            <a:r>
+              <a:rPr lang="en-AU">
+                <a:solidFill>
+                  <a:srgbClr val="4C5DBA"/>
+                </a:solidFill>
+              </a:rPr>
+              <a:t>extract</a:t>
+            </a:r>
+            <a:endParaRPr lang="en-AU" dirty="0">
+              <a:solidFill>
+                <a:srgbClr val="4C5DBA"/>
+              </a:solidFill>
+            </a:endParaRPr>
           </a:p>
         </p:txBody>
       </p:sp>
@@ -6022,410 +6803,10 @@
       </p:grpSpPr>
       <p:sp>
         <p:nvSpPr>
-          <p:cNvPr id="2" name="Text Placeholder 1">
-            <a:extLst>
-              <a:ext uri="{FF2B5EF4-FFF2-40B4-BE49-F238E27FC236}">
-                <a16:creationId xmlns:a16="http://schemas.microsoft.com/office/drawing/2014/main" id="{3B330F55-1E0C-84B6-1179-A3D8AC9B76A3}"/>
-              </a:ext>
-            </a:extLst>
-          </p:cNvPr>
-          <p:cNvSpPr>
-            <a:spLocks noGrp="1"/>
-          </p:cNvSpPr>
-          <p:nvPr>
-            <p:ph type="body" sz="quarter" idx="10"/>
-          </p:nvPr>
-        </p:nvSpPr>
-        <p:spPr/>
-        <p:txBody>
-          <a:bodyPr/>
-          <a:lstStyle/>
-          <a:p>
-            <a:endParaRPr lang="en-AU"/>
-          </a:p>
-        </p:txBody>
-      </p:sp>
-      <p:sp>
-        <p:nvSpPr>
-          <p:cNvPr id="3" name="Text Placeholder 2">
-            <a:extLst>
-              <a:ext uri="{FF2B5EF4-FFF2-40B4-BE49-F238E27FC236}">
-                <a16:creationId xmlns:a16="http://schemas.microsoft.com/office/drawing/2014/main" id="{00EBD3A1-6EF3-1C86-8945-5A4EDE170C29}"/>
-              </a:ext>
-            </a:extLst>
-          </p:cNvPr>
-          <p:cNvSpPr>
-            <a:spLocks noGrp="1"/>
-          </p:cNvSpPr>
-          <p:nvPr>
-            <p:ph type="body" sz="quarter" idx="11"/>
-          </p:nvPr>
-        </p:nvSpPr>
-        <p:spPr/>
-        <p:txBody>
-          <a:bodyPr/>
-          <a:lstStyle/>
-          <a:p>
-            <a:endParaRPr lang="en-AU"/>
-          </a:p>
-        </p:txBody>
-      </p:sp>
-      <p:sp>
-        <p:nvSpPr>
-          <p:cNvPr id="4" name="Text Placeholder 3">
-            <a:extLst>
-              <a:ext uri="{FF2B5EF4-FFF2-40B4-BE49-F238E27FC236}">
-                <a16:creationId xmlns:a16="http://schemas.microsoft.com/office/drawing/2014/main" id="{3EA43DCB-E7A0-4578-8C0D-AE87E1064A61}"/>
-              </a:ext>
-            </a:extLst>
-          </p:cNvPr>
-          <p:cNvSpPr>
-            <a:spLocks noGrp="1"/>
-          </p:cNvSpPr>
-          <p:nvPr>
-            <p:ph type="body" sz="quarter" idx="32"/>
-          </p:nvPr>
-        </p:nvSpPr>
-        <p:spPr/>
-        <p:txBody>
-          <a:bodyPr/>
-          <a:lstStyle/>
-          <a:p>
-            <a:endParaRPr lang="en-AU"/>
-          </a:p>
-        </p:txBody>
-      </p:sp>
-      <p:sp>
-        <p:nvSpPr>
-          <p:cNvPr id="5" name="Text Placeholder 4">
-            <a:extLst>
-              <a:ext uri="{FF2B5EF4-FFF2-40B4-BE49-F238E27FC236}">
-                <a16:creationId xmlns:a16="http://schemas.microsoft.com/office/drawing/2014/main" id="{4E80059F-CC09-F37B-27B0-C44959662C52}"/>
-              </a:ext>
-            </a:extLst>
-          </p:cNvPr>
-          <p:cNvSpPr>
-            <a:spLocks noGrp="1"/>
-          </p:cNvSpPr>
-          <p:nvPr>
-            <p:ph type="body" sz="quarter" idx="33"/>
-          </p:nvPr>
-        </p:nvSpPr>
-        <p:spPr/>
-        <p:txBody>
-          <a:bodyPr/>
-          <a:lstStyle/>
-          <a:p>
-            <a:endParaRPr lang="en-AU"/>
-          </a:p>
-        </p:txBody>
-      </p:sp>
-      <p:sp>
-        <p:nvSpPr>
-          <p:cNvPr id="6" name="Text Placeholder 5">
-            <a:extLst>
-              <a:ext uri="{FF2B5EF4-FFF2-40B4-BE49-F238E27FC236}">
-                <a16:creationId xmlns:a16="http://schemas.microsoft.com/office/drawing/2014/main" id="{32B7EF5A-9F99-E0EB-65C7-F790DE8A0B0E}"/>
-              </a:ext>
-            </a:extLst>
-          </p:cNvPr>
-          <p:cNvSpPr>
-            <a:spLocks noGrp="1"/>
-          </p:cNvSpPr>
-          <p:nvPr>
-            <p:ph type="body" sz="quarter" idx="34"/>
-          </p:nvPr>
-        </p:nvSpPr>
-        <p:spPr/>
-        <p:txBody>
-          <a:bodyPr/>
-          <a:lstStyle/>
-          <a:p>
-            <a:endParaRPr lang="en-AU"/>
-          </a:p>
-        </p:txBody>
-      </p:sp>
-      <p:sp>
-        <p:nvSpPr>
-          <p:cNvPr id="7" name="Text Placeholder 6">
-            <a:extLst>
-              <a:ext uri="{FF2B5EF4-FFF2-40B4-BE49-F238E27FC236}">
-                <a16:creationId xmlns:a16="http://schemas.microsoft.com/office/drawing/2014/main" id="{9BCCC386-198F-15FD-C9E5-8FA3ECED2617}"/>
-              </a:ext>
-            </a:extLst>
-          </p:cNvPr>
-          <p:cNvSpPr>
-            <a:spLocks noGrp="1"/>
-          </p:cNvSpPr>
-          <p:nvPr>
-            <p:ph type="body" sz="quarter" idx="35"/>
-          </p:nvPr>
-        </p:nvSpPr>
-        <p:spPr/>
-        <p:txBody>
-          <a:bodyPr/>
-          <a:lstStyle/>
-          <a:p>
-            <a:endParaRPr lang="en-AU"/>
-          </a:p>
-        </p:txBody>
-      </p:sp>
-      <p:sp>
-        <p:nvSpPr>
-          <p:cNvPr id="8" name="Text Placeholder 7">
-            <a:extLst>
-              <a:ext uri="{FF2B5EF4-FFF2-40B4-BE49-F238E27FC236}">
-                <a16:creationId xmlns:a16="http://schemas.microsoft.com/office/drawing/2014/main" id="{9FC16DD6-4CF4-1034-7B15-27C0EBFAAE78}"/>
-              </a:ext>
-            </a:extLst>
-          </p:cNvPr>
-          <p:cNvSpPr>
-            <a:spLocks noGrp="1"/>
-          </p:cNvSpPr>
-          <p:nvPr>
-            <p:ph type="body" sz="quarter" idx="36"/>
-          </p:nvPr>
-        </p:nvSpPr>
-        <p:spPr/>
-        <p:txBody>
-          <a:bodyPr/>
-          <a:lstStyle/>
-          <a:p>
-            <a:endParaRPr lang="en-AU"/>
-          </a:p>
-        </p:txBody>
-      </p:sp>
-      <p:sp>
-        <p:nvSpPr>
-          <p:cNvPr id="9" name="Text Placeholder 8">
-            <a:extLst>
-              <a:ext uri="{FF2B5EF4-FFF2-40B4-BE49-F238E27FC236}">
-                <a16:creationId xmlns:a16="http://schemas.microsoft.com/office/drawing/2014/main" id="{F3CDF25B-42A6-82DF-635D-7F182868BC54}"/>
-              </a:ext>
-            </a:extLst>
-          </p:cNvPr>
-          <p:cNvSpPr>
-            <a:spLocks noGrp="1"/>
-          </p:cNvSpPr>
-          <p:nvPr>
-            <p:ph type="body" sz="quarter" idx="37"/>
-          </p:nvPr>
-        </p:nvSpPr>
-        <p:spPr/>
-        <p:txBody>
-          <a:bodyPr/>
-          <a:lstStyle/>
-          <a:p>
-            <a:endParaRPr lang="en-AU"/>
-          </a:p>
-        </p:txBody>
-      </p:sp>
-      <p:sp>
-        <p:nvSpPr>
-          <p:cNvPr id="10" name="Text Placeholder 9">
-            <a:extLst>
-              <a:ext uri="{FF2B5EF4-FFF2-40B4-BE49-F238E27FC236}">
-                <a16:creationId xmlns:a16="http://schemas.microsoft.com/office/drawing/2014/main" id="{6EFCB200-CC76-54D5-5D41-EF23CE8A20ED}"/>
-              </a:ext>
-            </a:extLst>
-          </p:cNvPr>
-          <p:cNvSpPr>
-            <a:spLocks noGrp="1"/>
-          </p:cNvSpPr>
-          <p:nvPr>
-            <p:ph type="body" sz="quarter" idx="38"/>
-          </p:nvPr>
-        </p:nvSpPr>
-        <p:spPr/>
-        <p:txBody>
-          <a:bodyPr/>
-          <a:lstStyle/>
-          <a:p>
-            <a:endParaRPr lang="en-AU"/>
-          </a:p>
-        </p:txBody>
-      </p:sp>
-      <p:sp>
-        <p:nvSpPr>
-          <p:cNvPr id="11" name="Text Placeholder 10">
-            <a:extLst>
-              <a:ext uri="{FF2B5EF4-FFF2-40B4-BE49-F238E27FC236}">
-                <a16:creationId xmlns:a16="http://schemas.microsoft.com/office/drawing/2014/main" id="{A685A1DE-E855-53E9-985B-933424523BA4}"/>
-              </a:ext>
-            </a:extLst>
-          </p:cNvPr>
-          <p:cNvSpPr>
-            <a:spLocks noGrp="1"/>
-          </p:cNvSpPr>
-          <p:nvPr>
-            <p:ph type="body" sz="quarter" idx="39"/>
-          </p:nvPr>
-        </p:nvSpPr>
-        <p:spPr/>
-        <p:txBody>
-          <a:bodyPr/>
-          <a:lstStyle/>
-          <a:p>
-            <a:endParaRPr lang="en-AU"/>
-          </a:p>
-        </p:txBody>
-      </p:sp>
-      <p:sp>
-        <p:nvSpPr>
-          <p:cNvPr id="12" name="Text Placeholder 11">
-            <a:extLst>
-              <a:ext uri="{FF2B5EF4-FFF2-40B4-BE49-F238E27FC236}">
-                <a16:creationId xmlns:a16="http://schemas.microsoft.com/office/drawing/2014/main" id="{5E70B6B3-BC5E-3391-16CD-48E888CCDC43}"/>
-              </a:ext>
-            </a:extLst>
-          </p:cNvPr>
-          <p:cNvSpPr>
-            <a:spLocks noGrp="1"/>
-          </p:cNvSpPr>
-          <p:nvPr>
-            <p:ph type="body" sz="quarter" idx="40"/>
-          </p:nvPr>
-        </p:nvSpPr>
-        <p:spPr/>
-        <p:txBody>
-          <a:bodyPr/>
-          <a:lstStyle/>
-          <a:p>
-            <a:endParaRPr lang="en-AU"/>
-          </a:p>
-        </p:txBody>
-      </p:sp>
-      <p:sp>
-        <p:nvSpPr>
-          <p:cNvPr id="13" name="Text Placeholder 12">
-            <a:extLst>
-              <a:ext uri="{FF2B5EF4-FFF2-40B4-BE49-F238E27FC236}">
-                <a16:creationId xmlns:a16="http://schemas.microsoft.com/office/drawing/2014/main" id="{6049D956-DC8B-7829-076A-0E68B6323DC0}"/>
-              </a:ext>
-            </a:extLst>
-          </p:cNvPr>
-          <p:cNvSpPr>
-            <a:spLocks noGrp="1"/>
-          </p:cNvSpPr>
-          <p:nvPr>
-            <p:ph type="body" sz="quarter" idx="41"/>
-          </p:nvPr>
-        </p:nvSpPr>
-        <p:spPr/>
-        <p:txBody>
-          <a:bodyPr/>
-          <a:lstStyle/>
-          <a:p>
-            <a:endParaRPr lang="en-AU"/>
-          </a:p>
-        </p:txBody>
-      </p:sp>
-      <p:sp>
-        <p:nvSpPr>
-          <p:cNvPr id="14" name="Text Placeholder 13">
-            <a:extLst>
-              <a:ext uri="{FF2B5EF4-FFF2-40B4-BE49-F238E27FC236}">
-                <a16:creationId xmlns:a16="http://schemas.microsoft.com/office/drawing/2014/main" id="{9424BB0A-5A04-D804-7EA7-E30020297B78}"/>
-              </a:ext>
-            </a:extLst>
-          </p:cNvPr>
-          <p:cNvSpPr>
-            <a:spLocks noGrp="1"/>
-          </p:cNvSpPr>
-          <p:nvPr>
-            <p:ph type="body" sz="quarter" idx="42"/>
-          </p:nvPr>
-        </p:nvSpPr>
-        <p:spPr/>
-        <p:txBody>
-          <a:bodyPr/>
-          <a:lstStyle/>
-          <a:p>
-            <a:endParaRPr lang="en-AU"/>
-          </a:p>
-        </p:txBody>
-      </p:sp>
-      <p:sp>
-        <p:nvSpPr>
-          <p:cNvPr id="15" name="Text Placeholder 14">
-            <a:extLst>
-              <a:ext uri="{FF2B5EF4-FFF2-40B4-BE49-F238E27FC236}">
-                <a16:creationId xmlns:a16="http://schemas.microsoft.com/office/drawing/2014/main" id="{8C3C7069-6660-871A-05B8-9A2004A1C6E8}"/>
-              </a:ext>
-            </a:extLst>
-          </p:cNvPr>
-          <p:cNvSpPr>
-            <a:spLocks noGrp="1"/>
-          </p:cNvSpPr>
-          <p:nvPr>
-            <p:ph type="body" sz="quarter" idx="43"/>
-          </p:nvPr>
-        </p:nvSpPr>
-        <p:spPr/>
-        <p:txBody>
-          <a:bodyPr/>
-          <a:lstStyle/>
-          <a:p>
-            <a:endParaRPr lang="en-AU"/>
-          </a:p>
-        </p:txBody>
-      </p:sp>
-      <p:sp>
-        <p:nvSpPr>
-          <p:cNvPr id="16" name="Text Placeholder 15">
-            <a:extLst>
-              <a:ext uri="{FF2B5EF4-FFF2-40B4-BE49-F238E27FC236}">
-                <a16:creationId xmlns:a16="http://schemas.microsoft.com/office/drawing/2014/main" id="{F15FB35C-46F0-D7C0-F8EF-930723B3DC53}"/>
-              </a:ext>
-            </a:extLst>
-          </p:cNvPr>
-          <p:cNvSpPr>
-            <a:spLocks noGrp="1"/>
-          </p:cNvSpPr>
-          <p:nvPr>
-            <p:ph type="body" sz="quarter" idx="44"/>
-          </p:nvPr>
-        </p:nvSpPr>
-        <p:spPr/>
-        <p:txBody>
-          <a:bodyPr/>
-          <a:lstStyle/>
-          <a:p>
-            <a:endParaRPr lang="en-AU"/>
-          </a:p>
-        </p:txBody>
-      </p:sp>
-      <p:sp>
-        <p:nvSpPr>
-          <p:cNvPr id="17" name="Text Placeholder 16">
-            <a:extLst>
-              <a:ext uri="{FF2B5EF4-FFF2-40B4-BE49-F238E27FC236}">
-                <a16:creationId xmlns:a16="http://schemas.microsoft.com/office/drawing/2014/main" id="{F2D32BB4-573F-E15B-DFCF-94A020AA14F7}"/>
-              </a:ext>
-            </a:extLst>
-          </p:cNvPr>
-          <p:cNvSpPr>
-            <a:spLocks noGrp="1"/>
-          </p:cNvSpPr>
-          <p:nvPr>
-            <p:ph type="body" sz="quarter" idx="45"/>
-          </p:nvPr>
-        </p:nvSpPr>
-        <p:spPr/>
-        <p:txBody>
-          <a:bodyPr/>
-          <a:lstStyle/>
-          <a:p>
-            <a:endParaRPr lang="en-AU"/>
-          </a:p>
-        </p:txBody>
-      </p:sp>
-      <p:sp>
-        <p:nvSpPr>
           <p:cNvPr id="18" name="Title 17">
             <a:extLst>
               <a:ext uri="{FF2B5EF4-FFF2-40B4-BE49-F238E27FC236}">
-                <a16:creationId xmlns:a16="http://schemas.microsoft.com/office/drawing/2014/main" id="{B6B4CFD8-1240-704E-2C76-FA078A62ACB8}"/>
+                <a16:creationId xmlns:a16="http://schemas.microsoft.com/office/drawing/2014/main" id="{8311A977-A1F3-FAC7-860C-2D9B41E9146A}"/>
               </a:ext>
             </a:extLst>
           </p:cNvPr>
@@ -6444,67 +6825,9 @@
             <a:r>
               <a:rPr lang="en-AU" dirty="0">
                 <a:solidFill>
-                  <a:srgbClr val="A5DAC6"/>
+                  <a:srgbClr val="1B895F"/>
                 </a:solidFill>
               </a:rPr>
-              <a:t>load</a:t>
-            </a:r>
-          </a:p>
-        </p:txBody>
-      </p:sp>
-    </p:spTree>
-    <p:extLst>
-      <p:ext uri="{BB962C8B-B14F-4D97-AF65-F5344CB8AC3E}">
-        <p14:creationId xmlns:p14="http://schemas.microsoft.com/office/powerpoint/2010/main" val="1357195740"/>
-      </p:ext>
-    </p:extLst>
-  </p:cSld>
-  <p:clrMapOvr>
-    <a:masterClrMapping/>
-  </p:clrMapOvr>
-</p:sld>
-</file>
-
-<file path=ppt/slides/slide5.xml><?xml version="1.0" encoding="utf-8"?>
-<p:sld xmlns:a="http://schemas.openxmlformats.org/drawingml/2006/main" xmlns:r="http://schemas.openxmlformats.org/officeDocument/2006/relationships" xmlns:p="http://schemas.openxmlformats.org/presentationml/2006/main">
-  <p:cSld>
-    <p:spTree>
-      <p:nvGrpSpPr>
-        <p:cNvPr id="1" name=""/>
-        <p:cNvGrpSpPr/>
-        <p:nvPr/>
-      </p:nvGrpSpPr>
-      <p:grpSpPr>
-        <a:xfrm>
-          <a:off x="0" y="0"/>
-          <a:ext cx="0" cy="0"/>
-          <a:chOff x="0" y="0"/>
-          <a:chExt cx="0" cy="0"/>
-        </a:xfrm>
-      </p:grpSpPr>
-      <p:sp>
-        <p:nvSpPr>
-          <p:cNvPr id="18" name="Title 17">
-            <a:extLst>
-              <a:ext uri="{FF2B5EF4-FFF2-40B4-BE49-F238E27FC236}">
-                <a16:creationId xmlns:a16="http://schemas.microsoft.com/office/drawing/2014/main" id="{8311A977-A1F3-FAC7-860C-2D9B41E9146A}"/>
-              </a:ext>
-            </a:extLst>
-          </p:cNvPr>
-          <p:cNvSpPr>
-            <a:spLocks noGrp="1"/>
-          </p:cNvSpPr>
-          <p:nvPr>
-            <p:ph type="title"/>
-          </p:nvPr>
-        </p:nvSpPr>
-        <p:spPr/>
-        <p:txBody>
-          <a:bodyPr/>
-          <a:lstStyle/>
-          <a:p>
-            <a:r>
-              <a:rPr lang="en-AU" dirty="0"/>
               <a:t>load</a:t>
             </a:r>
             <a:br>
@@ -6536,7 +6859,7 @@
         </p:blipFill>
         <p:spPr>
           <a:xfrm>
-            <a:off x="3243532" y="1088136"/>
+            <a:off x="2954654" y="1596136"/>
             <a:ext cx="6412029" cy="5184296"/>
           </a:xfrm>
           <a:prstGeom prst="rect">
@@ -6566,7 +6889,7 @@
         </p:blipFill>
         <p:spPr>
           <a:xfrm>
-            <a:off x="230124" y="1088136"/>
+            <a:off x="230124" y="1596136"/>
             <a:ext cx="2724530" cy="5134692"/>
           </a:xfrm>
           <a:prstGeom prst="rect">
@@ -6596,7 +6919,7 @@
         </p:blipFill>
         <p:spPr>
           <a:xfrm>
-            <a:off x="9652670" y="2143664"/>
+            <a:off x="9779115" y="2651664"/>
             <a:ext cx="2312098" cy="2570671"/>
           </a:xfrm>
           <a:prstGeom prst="rect">
@@ -6604,6 +6927,87 @@
           </a:prstGeom>
         </p:spPr>
       </p:pic>
+      <p:sp>
+        <p:nvSpPr>
+          <p:cNvPr id="2" name="Arrow: Striped Right 1">
+            <a:extLst>
+              <a:ext uri="{FF2B5EF4-FFF2-40B4-BE49-F238E27FC236}">
+                <a16:creationId xmlns:a16="http://schemas.microsoft.com/office/drawing/2014/main" id="{B340F5C9-AE7B-97D4-4C6D-D198047128FB}"/>
+              </a:ext>
+            </a:extLst>
+          </p:cNvPr>
+          <p:cNvSpPr/>
+          <p:nvPr/>
+        </p:nvSpPr>
+        <p:spPr>
+          <a:xfrm>
+            <a:off x="9366684" y="3742906"/>
+            <a:ext cx="717596" cy="439947"/>
+          </a:xfrm>
+          <a:prstGeom prst="stripedRightArrow">
+            <a:avLst/>
+          </a:prstGeom>
+        </p:spPr>
+        <p:style>
+          <a:lnRef idx="2">
+            <a:schemeClr val="accent3">
+              <a:shade val="50000"/>
+            </a:schemeClr>
+          </a:lnRef>
+          <a:fillRef idx="1">
+            <a:schemeClr val="accent3"/>
+          </a:fillRef>
+          <a:effectRef idx="0">
+            <a:schemeClr val="accent3"/>
+          </a:effectRef>
+          <a:fontRef idx="minor">
+            <a:schemeClr val="lt1"/>
+          </a:fontRef>
+        </p:style>
+        <p:txBody>
+          <a:bodyPr rtlCol="0" anchor="ctr"/>
+          <a:lstStyle/>
+          <a:p>
+            <a:pPr algn="ctr"/>
+            <a:endParaRPr lang="en-AU"/>
+          </a:p>
+        </p:txBody>
+      </p:sp>
+      <p:sp>
+        <p:nvSpPr>
+          <p:cNvPr id="3" name="TextBox 2">
+            <a:extLst>
+              <a:ext uri="{FF2B5EF4-FFF2-40B4-BE49-F238E27FC236}">
+                <a16:creationId xmlns:a16="http://schemas.microsoft.com/office/drawing/2014/main" id="{AA8C3C18-732D-E692-6022-8DBBA1740DD6}"/>
+              </a:ext>
+            </a:extLst>
+          </p:cNvPr>
+          <p:cNvSpPr txBox="1"/>
+          <p:nvPr/>
+        </p:nvSpPr>
+        <p:spPr>
+          <a:xfrm>
+            <a:off x="230124" y="1089383"/>
+            <a:ext cx="11861089" cy="369332"/>
+          </a:xfrm>
+          <a:prstGeom prst="rect">
+            <a:avLst/>
+          </a:prstGeom>
+          <a:noFill/>
+        </p:spPr>
+        <p:txBody>
+          <a:bodyPr wrap="square" rtlCol="0">
+            <a:spAutoFit/>
+          </a:bodyPr>
+          <a:lstStyle/>
+          <a:p>
+            <a:r>
+              <a:rPr lang="en-AU" dirty="0"/>
+              <a:t>We will create a Database and Schema in PostgreSQL then Load the data for future Analysis</a:t>
+            </a:r>
+          </a:p>
+        </p:txBody>
+      </p:sp>
     </p:spTree>
     <p:extLst>
       <p:ext uri="{BB962C8B-B14F-4D97-AF65-F5344CB8AC3E}">
@@ -7060,21 +7464,21 @@
 </file>
 
 <file path=customXml/item2.xml><?xml version="1.0" encoding="utf-8"?>
+<p:properties xmlns:p="http://schemas.microsoft.com/office/2006/metadata/properties" xmlns:xsi="http://www.w3.org/2001/XMLSchema-instance" xmlns:pc="http://schemas.microsoft.com/office/infopath/2007/PartnerControls">
+  <documentManagement>
+    <Status xmlns="71af3243-3dd4-4a8d-8c0d-dd76da1f02a5">Not started</Status>
+    <MediaServiceKeyPoints xmlns="71af3243-3dd4-4a8d-8c0d-dd76da1f02a5" xsi:nil="true"/>
+  </documentManagement>
+</p:properties>
+</file>
+
+<file path=customXml/item3.xml><?xml version="1.0" encoding="utf-8"?>
 <?mso-contentType ?>
 <FormTemplates xmlns="http://schemas.microsoft.com/sharepoint/v3/contenttype/forms">
   <Display>DocumentLibraryForm</Display>
   <Edit>DocumentLibraryForm</Edit>
   <New>DocumentLibraryForm</New>
 </FormTemplates>
-</file>
-
-<file path=customXml/item3.xml><?xml version="1.0" encoding="utf-8"?>
-<p:properties xmlns:p="http://schemas.microsoft.com/office/2006/metadata/properties" xmlns:xsi="http://www.w3.org/2001/XMLSchema-instance" xmlns:pc="http://schemas.microsoft.com/office/infopath/2007/PartnerControls">
-  <documentManagement>
-    <Status xmlns="71af3243-3dd4-4a8d-8c0d-dd76da1f02a5">Not started</Status>
-    <MediaServiceKeyPoints xmlns="71af3243-3dd4-4a8d-8c0d-dd76da1f02a5" xsi:nil="true"/>
-  </documentManagement>
-</p:properties>
 </file>
 
 <file path=customXml/itemProps1.xml><?xml version="1.0" encoding="utf-8"?>
@@ -7097,14 +7501,6 @@
 </file>
 
 <file path=customXml/itemProps2.xml><?xml version="1.0" encoding="utf-8"?>
-<ds:datastoreItem xmlns:ds="http://schemas.openxmlformats.org/officeDocument/2006/customXml" ds:itemID="{466BA265-3C9C-41FF-80C6-61A7F961C0DC}">
-  <ds:schemaRefs>
-    <ds:schemaRef ds:uri="http://schemas.microsoft.com/sharepoint/v3/contenttype/forms"/>
-  </ds:schemaRefs>
-</ds:datastoreItem>
-</file>
-
-<file path=customXml/itemProps3.xml><?xml version="1.0" encoding="utf-8"?>
 <ds:datastoreItem xmlns:ds="http://schemas.openxmlformats.org/officeDocument/2006/customXml" ds:itemID="{B211B2B9-8CE5-4E5A-B70F-6B056FE844E8}">
   <ds:schemaRefs>
     <ds:schemaRef ds:uri="http://schemas.microsoft.com/office/2006/metadata/properties"/>
@@ -7112,4 +7508,12 @@
     <ds:schemaRef ds:uri="71af3243-3dd4-4a8d-8c0d-dd76da1f02a5"/>
   </ds:schemaRefs>
 </ds:datastoreItem>
+</file>
+
+<file path=customXml/itemProps3.xml><?xml version="1.0" encoding="utf-8"?>
+<ds:datastoreItem xmlns:ds="http://schemas.openxmlformats.org/officeDocument/2006/customXml" ds:itemID="{466BA265-3C9C-41FF-80C6-61A7F961C0DC}">
+  <ds:schemaRefs>
+    <ds:schemaRef ds:uri="http://schemas.microsoft.com/sharepoint/v3/contenttype/forms"/>
+  </ds:schemaRefs>
+</ds:datastoreItem>
 </file>
</xml_diff>